<commit_message>
Made progress on the Poster
</commit_message>
<xml_diff>
--- a/ExpoPoster/Poster.pptx
+++ b/ExpoPoster/Poster.pptx
@@ -109,7 +109,7 @@
   </p:defaultTextStyle>
   <p:extLst>
     <p:ext uri="{EFAFB233-063F-42B5-8137-9DF3F51BA10A}">
-      <p15:sldGuideLst xmlns:p15="http://schemas.microsoft.com/office/powerpoint/2012/main" xmlns="">
+      <p15:sldGuideLst xmlns="" xmlns:p15="http://schemas.microsoft.com/office/powerpoint/2012/main">
         <p15:guide id="1" orient="horz" pos="10368">
           <p15:clr>
             <a:srgbClr val="A4A3A4"/>
@@ -1506,7 +1506,7 @@
           <p:cNvPr id="33" name="Picture 33" descr="A large green field&#10;&#10;Description generated with high confidence">
             <a:extLst>
               <a:ext uri="{FF2B5EF4-FFF2-40B4-BE49-F238E27FC236}">
-                <a16:creationId xmlns:a16="http://schemas.microsoft.com/office/drawing/2014/main" xmlns="" id="{7DBBADAF-CB85-4A8C-AEDD-F5A4319DFC7C}"/>
+                <a16:creationId xmlns="" xmlns:a16="http://schemas.microsoft.com/office/drawing/2014/main" id="{7DBBADAF-CB85-4A8C-AEDD-F5A4319DFC7C}"/>
               </a:ext>
             </a:extLst>
           </p:cNvPr>
@@ -1796,7 +1796,7 @@
         <p:spPr>
           <a:xfrm>
             <a:off x="1920240" y="24028385"/>
-            <a:ext cx="9418320" cy="7067832"/>
+            <a:ext cx="9418320" cy="436017"/>
           </a:xfrm>
           <a:prstGeom prst="rect">
             <a:avLst/>
@@ -1976,1727 +1976,26 @@
           </a:lstStyle>
           <a:p>
             <a:r>
-              <a:rPr lang="en-US" dirty="0">
-                <a:latin typeface="Kievit Offc" charset="0"/>
-                <a:ea typeface="Kievit Offc" charset="0"/>
-                <a:cs typeface="Kievit Offc" charset="0"/>
-              </a:rPr>
-              <a:t>Body. </a:t>
-            </a:r>
-            <a:r>
-              <a:rPr lang="en-US" dirty="0" err="1">
-                <a:latin typeface="Kievit Offc" charset="0"/>
-                <a:ea typeface="Kievit Offc" charset="0"/>
-                <a:cs typeface="Kievit Offc" charset="0"/>
-              </a:rPr>
-              <a:t>Duismolessi</a:t>
-            </a:r>
-            <a:r>
-              <a:rPr lang="en-US" dirty="0">
-                <a:latin typeface="Kievit Offc" charset="0"/>
-                <a:ea typeface="Kievit Offc" charset="0"/>
-                <a:cs typeface="Kievit Offc" charset="0"/>
-              </a:rPr>
-              <a:t>. Del </a:t>
-            </a:r>
-            <a:r>
-              <a:rPr lang="en-US" dirty="0" err="1">
-                <a:latin typeface="Kievit Offc" charset="0"/>
-                <a:ea typeface="Kievit Offc" charset="0"/>
-                <a:cs typeface="Kievit Offc" charset="0"/>
-              </a:rPr>
-              <a:t>utem</a:t>
-            </a:r>
-            <a:r>
-              <a:rPr lang="en-US" dirty="0">
-                <a:latin typeface="Kievit Offc" charset="0"/>
-                <a:ea typeface="Kievit Offc" charset="0"/>
-                <a:cs typeface="Kievit Offc" charset="0"/>
-              </a:rPr>
-              <a:t> ex et, </a:t>
-            </a:r>
-            <a:r>
-              <a:rPr lang="en-US" dirty="0" err="1">
-                <a:latin typeface="Kievit Offc" charset="0"/>
-                <a:ea typeface="Kievit Offc" charset="0"/>
-                <a:cs typeface="Kievit Offc" charset="0"/>
-              </a:rPr>
-              <a:t>sumsan</a:t>
-            </a:r>
-            <a:r>
-              <a:rPr lang="en-US" dirty="0">
-                <a:latin typeface="Kievit Offc" charset="0"/>
-                <a:ea typeface="Kievit Offc" charset="0"/>
-                <a:cs typeface="Kievit Offc" charset="0"/>
-              </a:rPr>
-              <a:t> </a:t>
-            </a:r>
-            <a:r>
-              <a:rPr lang="en-US" dirty="0" err="1">
-                <a:latin typeface="Kievit Offc" charset="0"/>
-                <a:ea typeface="Kievit Offc" charset="0"/>
-                <a:cs typeface="Kievit Offc" charset="0"/>
-              </a:rPr>
-              <a:t>utat</a:t>
-            </a:r>
-            <a:r>
-              <a:rPr lang="en-US" dirty="0">
-                <a:latin typeface="Kievit Offc" charset="0"/>
-                <a:ea typeface="Kievit Offc" charset="0"/>
-                <a:cs typeface="Kievit Offc" charset="0"/>
-              </a:rPr>
-              <a:t> </a:t>
-            </a:r>
-            <a:r>
-              <a:rPr lang="en-US" dirty="0" err="1">
-                <a:latin typeface="Kievit Offc" charset="0"/>
-                <a:ea typeface="Kievit Offc" charset="0"/>
-                <a:cs typeface="Kievit Offc" charset="0"/>
-              </a:rPr>
-              <a:t>amet</a:t>
-            </a:r>
-            <a:r>
-              <a:rPr lang="en-US" dirty="0">
-                <a:latin typeface="Kievit Offc" charset="0"/>
-                <a:ea typeface="Kievit Offc" charset="0"/>
-                <a:cs typeface="Kievit Offc" charset="0"/>
-              </a:rPr>
-              <a:t> </a:t>
-            </a:r>
-            <a:r>
-              <a:rPr lang="en-US" dirty="0" err="1">
-                <a:latin typeface="Kievit Offc" charset="0"/>
-                <a:ea typeface="Kievit Offc" charset="0"/>
-                <a:cs typeface="Kievit Offc" charset="0"/>
-              </a:rPr>
-              <a:t>dolorero</a:t>
-            </a:r>
-            <a:r>
-              <a:rPr lang="en-US" dirty="0">
-                <a:latin typeface="Kievit Offc" charset="0"/>
-                <a:ea typeface="Kievit Offc" charset="0"/>
-                <a:cs typeface="Kievit Offc" charset="0"/>
-              </a:rPr>
-              <a:t> </a:t>
-            </a:r>
-            <a:r>
-              <a:rPr lang="en-US" dirty="0" err="1">
-                <a:latin typeface="Kievit Offc" charset="0"/>
-                <a:ea typeface="Kievit Offc" charset="0"/>
-                <a:cs typeface="Kievit Offc" charset="0"/>
-              </a:rPr>
-              <a:t>commy</a:t>
-            </a:r>
-            <a:r>
-              <a:rPr lang="en-US" dirty="0">
-                <a:latin typeface="Kievit Offc" charset="0"/>
-                <a:ea typeface="Kievit Offc" charset="0"/>
-                <a:cs typeface="Kievit Offc" charset="0"/>
-              </a:rPr>
-              <a:t> </a:t>
-            </a:r>
-            <a:r>
-              <a:rPr lang="en-US" dirty="0" err="1">
-                <a:latin typeface="Kievit Offc" charset="0"/>
-                <a:ea typeface="Kievit Offc" charset="0"/>
-                <a:cs typeface="Kievit Offc" charset="0"/>
-              </a:rPr>
-              <a:t>nulla</a:t>
-            </a:r>
-            <a:r>
-              <a:rPr lang="en-US" dirty="0">
-                <a:latin typeface="Kievit Offc" charset="0"/>
-                <a:ea typeface="Kievit Offc" charset="0"/>
-                <a:cs typeface="Kievit Offc" charset="0"/>
-              </a:rPr>
-              <a:t> </a:t>
-            </a:r>
-            <a:r>
-              <a:rPr lang="en-US" dirty="0" err="1">
-                <a:latin typeface="Kievit Offc" charset="0"/>
-                <a:ea typeface="Kievit Offc" charset="0"/>
-                <a:cs typeface="Kievit Offc" charset="0"/>
-              </a:rPr>
-              <a:t>feugait</a:t>
-            </a:r>
-            <a:r>
-              <a:rPr lang="en-US" dirty="0">
-                <a:latin typeface="Kievit Offc" charset="0"/>
-                <a:ea typeface="Kievit Offc" charset="0"/>
-                <a:cs typeface="Kievit Offc" charset="0"/>
-              </a:rPr>
-              <a:t>, sit </a:t>
-            </a:r>
-            <a:r>
-              <a:rPr lang="en-US" dirty="0" err="1">
-                <a:latin typeface="Kievit Offc" charset="0"/>
-                <a:ea typeface="Kievit Offc" charset="0"/>
-                <a:cs typeface="Kievit Offc" charset="0"/>
-              </a:rPr>
-              <a:t>alisci</a:t>
-            </a:r>
-            <a:r>
-              <a:rPr lang="en-US" dirty="0">
-                <a:latin typeface="Kievit Offc" charset="0"/>
-                <a:ea typeface="Kievit Offc" charset="0"/>
-                <a:cs typeface="Kievit Offc" charset="0"/>
-              </a:rPr>
-              <a:t> </a:t>
-            </a:r>
-            <a:r>
-              <a:rPr lang="en-US" dirty="0" err="1">
-                <a:latin typeface="Kievit Offc" charset="0"/>
-                <a:ea typeface="Kievit Offc" charset="0"/>
-                <a:cs typeface="Kievit Offc" charset="0"/>
-              </a:rPr>
-              <a:t>bla</a:t>
-            </a:r>
-            <a:r>
-              <a:rPr lang="en-US" dirty="0">
-                <a:latin typeface="Kievit Offc" charset="0"/>
-                <a:ea typeface="Kievit Offc" charset="0"/>
-                <a:cs typeface="Kievit Offc" charset="0"/>
-              </a:rPr>
-              <a:t> core </a:t>
-            </a:r>
-            <a:r>
-              <a:rPr lang="en-US" dirty="0" err="1">
-                <a:latin typeface="Kievit Offc" charset="0"/>
-                <a:ea typeface="Kievit Offc" charset="0"/>
-                <a:cs typeface="Kievit Offc" charset="0"/>
-              </a:rPr>
-              <a:t>doleniat</a:t>
-            </a:r>
-            <a:r>
-              <a:rPr lang="en-US" dirty="0">
-                <a:latin typeface="Kievit Offc" charset="0"/>
-                <a:ea typeface="Kievit Offc" charset="0"/>
-                <a:cs typeface="Kievit Offc" charset="0"/>
-              </a:rPr>
-              <a:t>, </a:t>
-            </a:r>
-            <a:r>
-              <a:rPr lang="en-US" dirty="0" err="1">
-                <a:latin typeface="Kievit Offc" charset="0"/>
-                <a:ea typeface="Kievit Offc" charset="0"/>
-                <a:cs typeface="Kievit Offc" charset="0"/>
-              </a:rPr>
-              <a:t>consectem</a:t>
-            </a:r>
-            <a:r>
-              <a:rPr lang="en-US" dirty="0">
-                <a:latin typeface="Kievit Offc" charset="0"/>
-                <a:ea typeface="Kievit Offc" charset="0"/>
-                <a:cs typeface="Kievit Offc" charset="0"/>
-              </a:rPr>
-              <a:t> </a:t>
-            </a:r>
-            <a:r>
-              <a:rPr lang="en-US" dirty="0" err="1">
-                <a:latin typeface="Kievit Offc" charset="0"/>
-                <a:ea typeface="Kievit Offc" charset="0"/>
-                <a:cs typeface="Kievit Offc" charset="0"/>
-              </a:rPr>
-              <a:t>volobore</a:t>
-            </a:r>
-            <a:r>
-              <a:rPr lang="en-US" dirty="0">
-                <a:latin typeface="Kievit Offc" charset="0"/>
-                <a:ea typeface="Kievit Offc" charset="0"/>
-                <a:cs typeface="Kievit Offc" charset="0"/>
-              </a:rPr>
-              <a:t> core </a:t>
-            </a:r>
-            <a:r>
-              <a:rPr lang="en-US" dirty="0" err="1">
-                <a:latin typeface="Kievit Offc" charset="0"/>
-                <a:ea typeface="Kievit Offc" charset="0"/>
-                <a:cs typeface="Kievit Offc" charset="0"/>
-              </a:rPr>
-              <a:t>eu</a:t>
-            </a:r>
-            <a:r>
-              <a:rPr lang="en-US" dirty="0">
-                <a:latin typeface="Kievit Offc" charset="0"/>
-                <a:ea typeface="Kievit Offc" charset="0"/>
-                <a:cs typeface="Kievit Offc" charset="0"/>
-              </a:rPr>
-              <a:t> </a:t>
-            </a:r>
-            <a:r>
-              <a:rPr lang="en-US" dirty="0" err="1">
-                <a:latin typeface="Kievit Offc" charset="0"/>
-                <a:ea typeface="Kievit Offc" charset="0"/>
-                <a:cs typeface="Kievit Offc" charset="0"/>
-              </a:rPr>
-              <a:t>facil</a:t>
-            </a:r>
-            <a:r>
-              <a:rPr lang="en-US" dirty="0">
-                <a:latin typeface="Kievit Offc" charset="0"/>
-                <a:ea typeface="Kievit Offc" charset="0"/>
-                <a:cs typeface="Kievit Offc" charset="0"/>
-              </a:rPr>
-              <a:t> </a:t>
-            </a:r>
-            <a:r>
-              <a:rPr lang="en-US" dirty="0" err="1">
-                <a:latin typeface="Kievit Offc" charset="0"/>
-                <a:ea typeface="Kievit Offc" charset="0"/>
-                <a:cs typeface="Kievit Offc" charset="0"/>
-              </a:rPr>
-              <a:t>irit</a:t>
-            </a:r>
-            <a:r>
-              <a:rPr lang="en-US" dirty="0">
-                <a:latin typeface="Kievit Offc" charset="0"/>
-                <a:ea typeface="Kievit Offc" charset="0"/>
-                <a:cs typeface="Kievit Offc" charset="0"/>
-              </a:rPr>
-              <a:t> dip et </a:t>
-            </a:r>
-            <a:r>
-              <a:rPr lang="en-US" dirty="0" err="1">
-                <a:latin typeface="Kievit Offc" charset="0"/>
-                <a:ea typeface="Kievit Offc" charset="0"/>
-                <a:cs typeface="Kievit Offc" charset="0"/>
-              </a:rPr>
-              <a:t>wis</a:t>
-            </a:r>
-            <a:r>
-              <a:rPr lang="en-US" dirty="0">
-                <a:latin typeface="Kievit Offc" charset="0"/>
-                <a:ea typeface="Kievit Offc" charset="0"/>
-                <a:cs typeface="Kievit Offc" charset="0"/>
-              </a:rPr>
-              <a:t> </a:t>
-            </a:r>
-            <a:r>
-              <a:rPr lang="en-US" dirty="0" err="1">
-                <a:latin typeface="Kievit Offc" charset="0"/>
-                <a:ea typeface="Kievit Offc" charset="0"/>
-                <a:cs typeface="Kievit Offc" charset="0"/>
-              </a:rPr>
-              <a:t>nim</a:t>
-            </a:r>
-            <a:r>
-              <a:rPr lang="en-US" dirty="0">
-                <a:latin typeface="Kievit Offc" charset="0"/>
-                <a:ea typeface="Kievit Offc" charset="0"/>
-                <a:cs typeface="Kievit Offc" charset="0"/>
-              </a:rPr>
-              <a:t> </a:t>
-            </a:r>
-            <a:r>
-              <a:rPr lang="en-US" dirty="0" err="1">
-                <a:latin typeface="Kievit Offc" charset="0"/>
-                <a:ea typeface="Kievit Offc" charset="0"/>
-                <a:cs typeface="Kievit Offc" charset="0"/>
-              </a:rPr>
-              <a:t>nostincin</a:t>
-            </a:r>
-            <a:r>
-              <a:rPr lang="en-US" dirty="0">
-                <a:latin typeface="Kievit Offc" charset="0"/>
-                <a:ea typeface="Kievit Offc" charset="0"/>
-                <a:cs typeface="Kievit Offc" charset="0"/>
-              </a:rPr>
-              <a:t> </a:t>
-            </a:r>
-            <a:r>
-              <a:rPr lang="en-US" dirty="0" err="1">
-                <a:latin typeface="Kievit Offc" charset="0"/>
-                <a:ea typeface="Kievit Offc" charset="0"/>
-                <a:cs typeface="Kievit Offc" charset="0"/>
-              </a:rPr>
-              <a:t>henim</a:t>
-            </a:r>
-            <a:r>
-              <a:rPr lang="en-US" dirty="0">
-                <a:latin typeface="Kievit Offc" charset="0"/>
-                <a:ea typeface="Kievit Offc" charset="0"/>
-                <a:cs typeface="Kievit Offc" charset="0"/>
-              </a:rPr>
-              <a:t> </a:t>
-            </a:r>
-            <a:r>
-              <a:rPr lang="en-US" dirty="0" err="1">
-                <a:latin typeface="Kievit Offc" charset="0"/>
-                <a:ea typeface="Kievit Offc" charset="0"/>
-                <a:cs typeface="Kievit Offc" charset="0"/>
-              </a:rPr>
-              <a:t>quamconsed</a:t>
-            </a:r>
-            <a:r>
-              <a:rPr lang="en-US" dirty="0">
-                <a:latin typeface="Kievit Offc" charset="0"/>
-                <a:ea typeface="Kievit Offc" charset="0"/>
-                <a:cs typeface="Kievit Offc" charset="0"/>
-              </a:rPr>
-              <a:t> tat </a:t>
-            </a:r>
-            <a:r>
-              <a:rPr lang="en-US" dirty="0" err="1">
-                <a:latin typeface="Kievit Offc" charset="0"/>
-                <a:ea typeface="Kievit Offc" charset="0"/>
-                <a:cs typeface="Kievit Offc" charset="0"/>
-              </a:rPr>
-              <a:t>veliscin</a:t>
-            </a:r>
-            <a:r>
-              <a:rPr lang="en-US" dirty="0">
-                <a:latin typeface="Kievit Offc" charset="0"/>
-                <a:ea typeface="Kievit Offc" charset="0"/>
-                <a:cs typeface="Kievit Offc" charset="0"/>
-              </a:rPr>
-              <a:t> </a:t>
-            </a:r>
-            <a:r>
-              <a:rPr lang="en-US" dirty="0" err="1">
-                <a:latin typeface="Kievit Offc" charset="0"/>
-                <a:ea typeface="Kievit Offc" charset="0"/>
-                <a:cs typeface="Kievit Offc" charset="0"/>
-              </a:rPr>
-              <a:t>ulputem</a:t>
-            </a:r>
-            <a:r>
-              <a:rPr lang="en-US" dirty="0">
-                <a:latin typeface="Kievit Offc" charset="0"/>
-                <a:ea typeface="Kievit Offc" charset="0"/>
-                <a:cs typeface="Kievit Offc" charset="0"/>
-              </a:rPr>
-              <a:t> </a:t>
-            </a:r>
-            <a:r>
-              <a:rPr lang="en-US" dirty="0" err="1">
-                <a:latin typeface="Kievit Offc" charset="0"/>
-                <a:ea typeface="Kievit Offc" charset="0"/>
-                <a:cs typeface="Kievit Offc" charset="0"/>
-              </a:rPr>
-              <a:t>vel</a:t>
-            </a:r>
-            <a:r>
-              <a:rPr lang="en-US" dirty="0">
-                <a:latin typeface="Kievit Offc" charset="0"/>
-                <a:ea typeface="Kievit Offc" charset="0"/>
-                <a:cs typeface="Kievit Offc" charset="0"/>
-              </a:rPr>
-              <a:t> </a:t>
-            </a:r>
-            <a:r>
-              <a:rPr lang="en-US" dirty="0" err="1">
-                <a:latin typeface="Kievit Offc" charset="0"/>
-                <a:ea typeface="Kievit Offc" charset="0"/>
-                <a:cs typeface="Kievit Offc" charset="0"/>
-              </a:rPr>
-              <a:t>ut</a:t>
-            </a:r>
-            <a:r>
-              <a:rPr lang="en-US" dirty="0">
-                <a:latin typeface="Kievit Offc" charset="0"/>
-                <a:ea typeface="Kievit Offc" charset="0"/>
-                <a:cs typeface="Kievit Offc" charset="0"/>
-              </a:rPr>
-              <a:t> </a:t>
-            </a:r>
-            <a:r>
-              <a:rPr lang="en-US" dirty="0" err="1">
-                <a:latin typeface="Kievit Offc" charset="0"/>
-                <a:ea typeface="Kievit Offc" charset="0"/>
-                <a:cs typeface="Kievit Offc" charset="0"/>
-              </a:rPr>
-              <a:t>Ovit</a:t>
-            </a:r>
-            <a:r>
-              <a:rPr lang="en-US" dirty="0">
-                <a:latin typeface="Kievit Offc" charset="0"/>
-                <a:ea typeface="Kievit Offc" charset="0"/>
-                <a:cs typeface="Kievit Offc" charset="0"/>
-              </a:rPr>
-              <a:t> </a:t>
-            </a:r>
-            <a:r>
-              <a:rPr lang="en-US" dirty="0" err="1">
-                <a:latin typeface="Kievit Offc" charset="0"/>
-                <a:ea typeface="Kievit Offc" charset="0"/>
-                <a:cs typeface="Kievit Offc" charset="0"/>
-              </a:rPr>
-              <a:t>eum</a:t>
-            </a:r>
-            <a:r>
-              <a:rPr lang="en-US" dirty="0">
-                <a:latin typeface="Kievit Offc" charset="0"/>
-                <a:ea typeface="Kievit Offc" charset="0"/>
-                <a:cs typeface="Kievit Offc" charset="0"/>
-              </a:rPr>
-              <a:t> </a:t>
-            </a:r>
-            <a:r>
-              <a:rPr lang="en-US" dirty="0" err="1">
-                <a:latin typeface="Kievit Offc" charset="0"/>
-                <a:ea typeface="Kievit Offc" charset="0"/>
-                <a:cs typeface="Kievit Offc" charset="0"/>
-              </a:rPr>
-              <a:t>facernatiunt</a:t>
-            </a:r>
-            <a:r>
-              <a:rPr lang="en-US" dirty="0">
-                <a:latin typeface="Kievit Offc" charset="0"/>
-                <a:ea typeface="Kievit Offc" charset="0"/>
-                <a:cs typeface="Kievit Offc" charset="0"/>
-              </a:rPr>
-              <a:t> </a:t>
-            </a:r>
-            <a:r>
-              <a:rPr lang="en-US" dirty="0" err="1">
-                <a:latin typeface="Kievit Offc" charset="0"/>
-                <a:ea typeface="Kievit Offc" charset="0"/>
-                <a:cs typeface="Kievit Offc" charset="0"/>
-              </a:rPr>
-              <a:t>harum</a:t>
-            </a:r>
-            <a:r>
-              <a:rPr lang="en-US" dirty="0">
-                <a:latin typeface="Kievit Offc" charset="0"/>
-                <a:ea typeface="Kievit Offc" charset="0"/>
-                <a:cs typeface="Kievit Offc" charset="0"/>
-              </a:rPr>
-              <a:t> as </a:t>
-            </a:r>
-            <a:r>
-              <a:rPr lang="en-US" dirty="0" err="1">
-                <a:latin typeface="Kievit Offc" charset="0"/>
-                <a:ea typeface="Kievit Offc" charset="0"/>
-                <a:cs typeface="Kievit Offc" charset="0"/>
-              </a:rPr>
-              <a:t>voloremquis</a:t>
-            </a:r>
-            <a:r>
-              <a:rPr lang="en-US" dirty="0">
-                <a:latin typeface="Kievit Offc" charset="0"/>
-                <a:ea typeface="Kievit Offc" charset="0"/>
-                <a:cs typeface="Kievit Offc" charset="0"/>
-              </a:rPr>
-              <a:t> </a:t>
-            </a:r>
-            <a:r>
-              <a:rPr lang="en-US" dirty="0" err="1">
-                <a:latin typeface="Kievit Offc" charset="0"/>
-                <a:ea typeface="Kievit Offc" charset="0"/>
-                <a:cs typeface="Kievit Offc" charset="0"/>
-              </a:rPr>
-              <a:t>ea</a:t>
-            </a:r>
-            <a:r>
-              <a:rPr lang="en-US" dirty="0">
-                <a:latin typeface="Kievit Offc" charset="0"/>
-                <a:ea typeface="Kievit Offc" charset="0"/>
-                <a:cs typeface="Kievit Offc" charset="0"/>
-              </a:rPr>
-              <a:t> </a:t>
-            </a:r>
-            <a:r>
-              <a:rPr lang="en-US" dirty="0" err="1">
-                <a:latin typeface="Kievit Offc" charset="0"/>
-                <a:ea typeface="Kievit Offc" charset="0"/>
-                <a:cs typeface="Kievit Offc" charset="0"/>
-              </a:rPr>
-              <a:t>si</a:t>
-            </a:r>
-            <a:r>
-              <a:rPr lang="en-US" dirty="0">
-                <a:latin typeface="Kievit Offc" charset="0"/>
-                <a:ea typeface="Kievit Offc" charset="0"/>
-                <a:cs typeface="Kievit Offc" charset="0"/>
-              </a:rPr>
-              <a:t> des alit, ant </a:t>
-            </a:r>
-            <a:r>
-              <a:rPr lang="en-US" dirty="0" err="1">
-                <a:latin typeface="Kievit Offc" charset="0"/>
-                <a:ea typeface="Kievit Offc" charset="0"/>
-                <a:cs typeface="Kievit Offc" charset="0"/>
-              </a:rPr>
-              <a:t>repuda</a:t>
-            </a:r>
-            <a:r>
-              <a:rPr lang="en-US" dirty="0">
-                <a:latin typeface="Kievit Offc" charset="0"/>
-                <a:ea typeface="Kievit Offc" charset="0"/>
-                <a:cs typeface="Kievit Offc" charset="0"/>
-              </a:rPr>
-              <a:t> </a:t>
-            </a:r>
-            <a:r>
-              <a:rPr lang="en-US" dirty="0" err="1">
-                <a:latin typeface="Kievit Offc" charset="0"/>
-                <a:ea typeface="Kievit Offc" charset="0"/>
-                <a:cs typeface="Kievit Offc" charset="0"/>
-              </a:rPr>
-              <a:t>ipietur</a:t>
-            </a:r>
-            <a:r>
-              <a:rPr lang="en-US" dirty="0">
-                <a:latin typeface="Kievit Offc" charset="0"/>
-                <a:ea typeface="Kievit Offc" charset="0"/>
-                <a:cs typeface="Kievit Offc" charset="0"/>
-              </a:rPr>
-              <a:t> </a:t>
-            </a:r>
-            <a:r>
-              <a:rPr lang="en-US" dirty="0" err="1">
-                <a:latin typeface="Kievit Offc" charset="0"/>
-                <a:ea typeface="Kievit Offc" charset="0"/>
-                <a:cs typeface="Kievit Offc" charset="0"/>
-              </a:rPr>
-              <a:t>rae</a:t>
-            </a:r>
-            <a:r>
-              <a:rPr lang="en-US" dirty="0">
-                <a:latin typeface="Kievit Offc" charset="0"/>
-                <a:ea typeface="Kievit Offc" charset="0"/>
-                <a:cs typeface="Kievit Offc" charset="0"/>
-              </a:rPr>
-              <a:t> </a:t>
-            </a:r>
-            <a:r>
-              <a:rPr lang="en-US" dirty="0" err="1">
-                <a:latin typeface="Kievit Offc" charset="0"/>
-                <a:ea typeface="Kievit Offc" charset="0"/>
-                <a:cs typeface="Kievit Offc" charset="0"/>
-              </a:rPr>
-              <a:t>apeditas</a:t>
-            </a:r>
-            <a:r>
-              <a:rPr lang="en-US" dirty="0">
-                <a:latin typeface="Kievit Offc" charset="0"/>
-                <a:ea typeface="Kievit Offc" charset="0"/>
-                <a:cs typeface="Kievit Offc" charset="0"/>
-              </a:rPr>
-              <a:t> </a:t>
-            </a:r>
-            <a:r>
-              <a:rPr lang="en-US" dirty="0" err="1">
-                <a:latin typeface="Kievit Offc" charset="0"/>
-                <a:ea typeface="Kievit Offc" charset="0"/>
-                <a:cs typeface="Kievit Offc" charset="0"/>
-              </a:rPr>
-              <a:t>maionserum</a:t>
-            </a:r>
-            <a:r>
-              <a:rPr lang="en-US" dirty="0">
-                <a:latin typeface="Kievit Offc" charset="0"/>
-                <a:ea typeface="Kievit Offc" charset="0"/>
-                <a:cs typeface="Kievit Offc" charset="0"/>
-              </a:rPr>
-              <a:t> </a:t>
-            </a:r>
-            <a:r>
-              <a:rPr lang="en-US" dirty="0" err="1">
-                <a:latin typeface="Kievit Offc" charset="0"/>
-                <a:ea typeface="Kievit Offc" charset="0"/>
-                <a:cs typeface="Kievit Offc" charset="0"/>
-              </a:rPr>
-              <a:t>vendaest</a:t>
-            </a:r>
-            <a:r>
-              <a:rPr lang="en-US" dirty="0">
-                <a:latin typeface="Kievit Offc" charset="0"/>
-                <a:ea typeface="Kievit Offc" charset="0"/>
-                <a:cs typeface="Kievit Offc" charset="0"/>
-              </a:rPr>
-              <a:t>?</a:t>
-            </a:r>
-          </a:p>
-          <a:p>
-            <a:r>
-              <a:rPr lang="en-US" dirty="0" err="1">
-                <a:latin typeface="Kievit Offc" charset="0"/>
-                <a:ea typeface="Kievit Offc" charset="0"/>
-                <a:cs typeface="Kievit Offc" charset="0"/>
-              </a:rPr>
-              <a:t>Beremporem</a:t>
-            </a:r>
-            <a:r>
-              <a:rPr lang="en-US" dirty="0">
-                <a:latin typeface="Kievit Offc" charset="0"/>
-                <a:ea typeface="Kievit Offc" charset="0"/>
-                <a:cs typeface="Kievit Offc" charset="0"/>
-              </a:rPr>
-              <a:t> </a:t>
-            </a:r>
-            <a:r>
-              <a:rPr lang="en-US" dirty="0" err="1">
-                <a:latin typeface="Kievit Offc" charset="0"/>
-                <a:ea typeface="Kievit Offc" charset="0"/>
-                <a:cs typeface="Kievit Offc" charset="0"/>
-              </a:rPr>
-              <a:t>quias</a:t>
-            </a:r>
-            <a:r>
-              <a:rPr lang="en-US" dirty="0">
-                <a:latin typeface="Kievit Offc" charset="0"/>
-                <a:ea typeface="Kievit Offc" charset="0"/>
-                <a:cs typeface="Kievit Offc" charset="0"/>
-              </a:rPr>
-              <a:t> is </a:t>
-            </a:r>
-            <a:r>
-              <a:rPr lang="en-US" dirty="0" err="1">
-                <a:latin typeface="Kievit Offc" charset="0"/>
-                <a:ea typeface="Kievit Offc" charset="0"/>
-                <a:cs typeface="Kievit Offc" charset="0"/>
-              </a:rPr>
-              <a:t>eaqui</a:t>
-            </a:r>
-            <a:r>
-              <a:rPr lang="en-US" dirty="0">
-                <a:latin typeface="Kievit Offc" charset="0"/>
-                <a:ea typeface="Kievit Offc" charset="0"/>
-                <a:cs typeface="Kievit Offc" charset="0"/>
-              </a:rPr>
-              <a:t> </a:t>
-            </a:r>
-            <a:r>
-              <a:rPr lang="en-US" dirty="0" err="1">
-                <a:latin typeface="Kievit Offc" charset="0"/>
-                <a:ea typeface="Kievit Offc" charset="0"/>
-                <a:cs typeface="Kievit Offc" charset="0"/>
-              </a:rPr>
-              <a:t>coratia</a:t>
-            </a:r>
-            <a:r>
-              <a:rPr lang="en-US" dirty="0">
-                <a:latin typeface="Kievit Offc" charset="0"/>
-                <a:ea typeface="Kievit Offc" charset="0"/>
-                <a:cs typeface="Kievit Offc" charset="0"/>
-              </a:rPr>
-              <a:t> </a:t>
-            </a:r>
-            <a:r>
-              <a:rPr lang="en-US" dirty="0" err="1">
-                <a:latin typeface="Kievit Offc" charset="0"/>
-                <a:ea typeface="Kievit Offc" charset="0"/>
-                <a:cs typeface="Kievit Offc" charset="0"/>
-              </a:rPr>
-              <a:t>epudandaerum</a:t>
-            </a:r>
-            <a:r>
-              <a:rPr lang="en-US" dirty="0">
-                <a:latin typeface="Kievit Offc" charset="0"/>
-                <a:ea typeface="Kievit Offc" charset="0"/>
-                <a:cs typeface="Kievit Offc" charset="0"/>
-              </a:rPr>
-              <a:t> </a:t>
-            </a:r>
-            <a:r>
-              <a:rPr lang="en-US" dirty="0" err="1">
-                <a:latin typeface="Kievit Offc" charset="0"/>
-                <a:ea typeface="Kievit Offc" charset="0"/>
-                <a:cs typeface="Kievit Offc" charset="0"/>
-              </a:rPr>
-              <a:t>accuptat</a:t>
-            </a:r>
-            <a:r>
-              <a:rPr lang="en-US" dirty="0">
-                <a:latin typeface="Kievit Offc" charset="0"/>
-                <a:ea typeface="Kievit Offc" charset="0"/>
-                <a:cs typeface="Kievit Offc" charset="0"/>
-              </a:rPr>
-              <a:t> </a:t>
-            </a:r>
-            <a:r>
-              <a:rPr lang="en-US" dirty="0" err="1">
-                <a:latin typeface="Kievit Offc" charset="0"/>
-                <a:ea typeface="Kievit Offc" charset="0"/>
-                <a:cs typeface="Kievit Offc" charset="0"/>
-              </a:rPr>
-              <a:t>voluptur</a:t>
-            </a:r>
-            <a:r>
-              <a:rPr lang="en-US" dirty="0">
-                <a:latin typeface="Kievit Offc" charset="0"/>
-                <a:ea typeface="Kievit Offc" charset="0"/>
-                <a:cs typeface="Kievit Offc" charset="0"/>
-              </a:rPr>
-              <a:t>, </a:t>
-            </a:r>
-            <a:r>
-              <a:rPr lang="en-US" dirty="0" err="1">
-                <a:latin typeface="Kievit Offc" charset="0"/>
-                <a:ea typeface="Kievit Offc" charset="0"/>
-                <a:cs typeface="Kievit Offc" charset="0"/>
-              </a:rPr>
-              <a:t>idest</a:t>
-            </a:r>
-            <a:r>
-              <a:rPr lang="en-US" dirty="0">
-                <a:latin typeface="Kievit Offc" charset="0"/>
-                <a:ea typeface="Kievit Offc" charset="0"/>
-                <a:cs typeface="Kievit Offc" charset="0"/>
-              </a:rPr>
-              <a:t>, </a:t>
-            </a:r>
-            <a:r>
-              <a:rPr lang="en-US" dirty="0" err="1">
-                <a:latin typeface="Kievit Offc" charset="0"/>
-                <a:ea typeface="Kievit Offc" charset="0"/>
-                <a:cs typeface="Kievit Offc" charset="0"/>
-              </a:rPr>
-              <a:t>cusciates</a:t>
-            </a:r>
-            <a:r>
-              <a:rPr lang="en-US" dirty="0">
-                <a:latin typeface="Kievit Offc" charset="0"/>
-                <a:ea typeface="Kievit Offc" charset="0"/>
-                <a:cs typeface="Kievit Offc" charset="0"/>
-              </a:rPr>
-              <a:t> et et </a:t>
-            </a:r>
-            <a:r>
-              <a:rPr lang="en-US" dirty="0" err="1">
-                <a:latin typeface="Kievit Offc" charset="0"/>
-                <a:ea typeface="Kievit Offc" charset="0"/>
-                <a:cs typeface="Kievit Offc" charset="0"/>
-              </a:rPr>
-              <a:t>atat</a:t>
-            </a:r>
-            <a:r>
-              <a:rPr lang="en-US" dirty="0">
-                <a:latin typeface="Kievit Offc" charset="0"/>
-                <a:ea typeface="Kievit Offc" charset="0"/>
-                <a:cs typeface="Kievit Offc" charset="0"/>
-              </a:rPr>
-              <a:t> </a:t>
-            </a:r>
-            <a:r>
-              <a:rPr lang="en-US" dirty="0" err="1">
-                <a:latin typeface="Kievit Offc" charset="0"/>
-                <a:ea typeface="Kievit Offc" charset="0"/>
-                <a:cs typeface="Kievit Offc" charset="0"/>
-              </a:rPr>
-              <a:t>volorrum</a:t>
-            </a:r>
-            <a:r>
-              <a:rPr lang="en-US" dirty="0">
-                <a:latin typeface="Kievit Offc" charset="0"/>
-                <a:ea typeface="Kievit Offc" charset="0"/>
-                <a:cs typeface="Kievit Offc" charset="0"/>
-              </a:rPr>
-              <a:t> </a:t>
-            </a:r>
-            <a:r>
-              <a:rPr lang="en-US" dirty="0" err="1">
-                <a:latin typeface="Kievit Offc" charset="0"/>
-                <a:ea typeface="Kievit Offc" charset="0"/>
-                <a:cs typeface="Kievit Offc" charset="0"/>
-              </a:rPr>
-              <a:t>quataerovit</a:t>
-            </a:r>
-            <a:r>
-              <a:rPr lang="en-US" dirty="0">
-                <a:latin typeface="Kievit Offc" charset="0"/>
-                <a:ea typeface="Kievit Offc" charset="0"/>
-                <a:cs typeface="Kievit Offc" charset="0"/>
-              </a:rPr>
-              <a:t>, </a:t>
-            </a:r>
-            <a:r>
-              <a:rPr lang="en-US" dirty="0" err="1">
-                <a:latin typeface="Kievit Offc" charset="0"/>
-                <a:ea typeface="Kievit Offc" charset="0"/>
-                <a:cs typeface="Kievit Offc" charset="0"/>
-              </a:rPr>
-              <a:t>sequunt</a:t>
-            </a:r>
-            <a:r>
-              <a:rPr lang="en-US" dirty="0">
-                <a:latin typeface="Kievit Offc" charset="0"/>
-                <a:ea typeface="Kievit Offc" charset="0"/>
-                <a:cs typeface="Kievit Offc" charset="0"/>
-              </a:rPr>
-              <a:t>, </a:t>
-            </a:r>
-            <a:r>
-              <a:rPr lang="en-US" dirty="0" err="1">
-                <a:latin typeface="Kievit Offc" charset="0"/>
-                <a:ea typeface="Kievit Offc" charset="0"/>
-                <a:cs typeface="Kievit Offc" charset="0"/>
-              </a:rPr>
-              <a:t>omnihilia</a:t>
-            </a:r>
-            <a:r>
-              <a:rPr lang="en-US" dirty="0">
-                <a:latin typeface="Kievit Offc" charset="0"/>
-                <a:ea typeface="Kievit Offc" charset="0"/>
-                <a:cs typeface="Kievit Offc" charset="0"/>
-              </a:rPr>
-              <a:t> </a:t>
-            </a:r>
-            <a:r>
-              <a:rPr lang="en-US" dirty="0" err="1">
-                <a:latin typeface="Kievit Offc" charset="0"/>
-                <a:ea typeface="Kievit Offc" charset="0"/>
-                <a:cs typeface="Kievit Offc" charset="0"/>
-              </a:rPr>
-              <a:t>conet</a:t>
-            </a:r>
-            <a:r>
-              <a:rPr lang="en-US" dirty="0">
-                <a:latin typeface="Kievit Offc" charset="0"/>
-                <a:ea typeface="Kievit Offc" charset="0"/>
-                <a:cs typeface="Kievit Offc" charset="0"/>
-              </a:rPr>
-              <a:t> et </a:t>
-            </a:r>
-            <a:r>
-              <a:rPr lang="en-US" dirty="0" err="1">
-                <a:latin typeface="Kievit Offc" charset="0"/>
-                <a:ea typeface="Kievit Offc" charset="0"/>
-                <a:cs typeface="Kievit Offc" charset="0"/>
-              </a:rPr>
-              <a:t>atia</a:t>
-            </a:r>
-            <a:r>
-              <a:rPr lang="en-US" dirty="0">
-                <a:latin typeface="Kievit Offc" charset="0"/>
-                <a:ea typeface="Kievit Offc" charset="0"/>
-                <a:cs typeface="Kievit Offc" charset="0"/>
-              </a:rPr>
-              <a:t> </a:t>
-            </a:r>
-            <a:r>
-              <a:rPr lang="en-US" dirty="0" err="1">
-                <a:latin typeface="Kievit Offc" charset="0"/>
-                <a:ea typeface="Kievit Offc" charset="0"/>
-                <a:cs typeface="Kievit Offc" charset="0"/>
-              </a:rPr>
-              <a:t>num</a:t>
-            </a:r>
-            <a:r>
-              <a:rPr lang="en-US" dirty="0">
-                <a:latin typeface="Kievit Offc" charset="0"/>
-                <a:ea typeface="Kievit Offc" charset="0"/>
-                <a:cs typeface="Kievit Offc" charset="0"/>
-              </a:rPr>
-              <a:t> </a:t>
-            </a:r>
-            <a:r>
-              <a:rPr lang="en-US" dirty="0" err="1">
-                <a:latin typeface="Kievit Offc" charset="0"/>
-                <a:ea typeface="Kievit Offc" charset="0"/>
-                <a:cs typeface="Kievit Offc" charset="0"/>
-              </a:rPr>
-              <a:t>sinciis</a:t>
-            </a:r>
-            <a:r>
-              <a:rPr lang="en-US" dirty="0">
-                <a:latin typeface="Kievit Offc" charset="0"/>
-                <a:ea typeface="Kievit Offc" charset="0"/>
-                <a:cs typeface="Kievit Offc" charset="0"/>
-              </a:rPr>
-              <a:t> re </a:t>
-            </a:r>
-            <a:r>
-              <a:rPr lang="en-US" dirty="0" err="1">
-                <a:latin typeface="Kievit Offc" charset="0"/>
-                <a:ea typeface="Kievit Offc" charset="0"/>
-                <a:cs typeface="Kievit Offc" charset="0"/>
-              </a:rPr>
-              <a:t>nam</a:t>
-            </a:r>
-            <a:r>
-              <a:rPr lang="en-US" dirty="0">
-                <a:latin typeface="Kievit Offc" charset="0"/>
-                <a:ea typeface="Kievit Offc" charset="0"/>
-                <a:cs typeface="Kievit Offc" charset="0"/>
-              </a:rPr>
-              <a:t> quid </a:t>
-            </a:r>
-            <a:r>
-              <a:rPr lang="en-US" dirty="0" err="1">
-                <a:latin typeface="Kievit Offc" charset="0"/>
-                <a:ea typeface="Kievit Offc" charset="0"/>
-                <a:cs typeface="Kievit Offc" charset="0"/>
-              </a:rPr>
-              <a:t>eos</a:t>
-            </a:r>
-            <a:r>
-              <a:rPr lang="en-US" dirty="0">
-                <a:latin typeface="Kievit Offc" charset="0"/>
-                <a:ea typeface="Kievit Offc" charset="0"/>
-                <a:cs typeface="Kievit Offc" charset="0"/>
-              </a:rPr>
-              <a:t> ex </a:t>
-            </a:r>
-            <a:r>
-              <a:rPr lang="en-US" dirty="0" err="1">
-                <a:latin typeface="Kievit Offc" charset="0"/>
-                <a:ea typeface="Kievit Offc" charset="0"/>
-                <a:cs typeface="Kievit Offc" charset="0"/>
-              </a:rPr>
-              <a:t>erias</a:t>
-            </a:r>
-            <a:r>
-              <a:rPr lang="en-US" dirty="0">
-                <a:latin typeface="Kievit Offc" charset="0"/>
-                <a:ea typeface="Kievit Offc" charset="0"/>
-                <a:cs typeface="Kievit Offc" charset="0"/>
-              </a:rPr>
-              <a:t> </a:t>
-            </a:r>
-            <a:r>
-              <a:rPr lang="en-US" dirty="0" err="1">
-                <a:latin typeface="Kievit Offc" charset="0"/>
-                <a:ea typeface="Kievit Offc" charset="0"/>
-                <a:cs typeface="Kievit Offc" charset="0"/>
-              </a:rPr>
-              <a:t>rae</a:t>
-            </a:r>
-            <a:r>
-              <a:rPr lang="en-US" dirty="0">
-                <a:latin typeface="Kievit Offc" charset="0"/>
-                <a:ea typeface="Kievit Offc" charset="0"/>
-                <a:cs typeface="Kievit Offc" charset="0"/>
-              </a:rPr>
-              <a:t> nus </a:t>
-            </a:r>
-            <a:r>
-              <a:rPr lang="en-US" dirty="0" err="1">
-                <a:latin typeface="Kievit Offc" charset="0"/>
-                <a:ea typeface="Kievit Offc" charset="0"/>
-                <a:cs typeface="Kievit Offc" charset="0"/>
-              </a:rPr>
-              <a:t>quis</a:t>
-            </a:r>
-            <a:r>
-              <a:rPr lang="en-US" dirty="0">
-                <a:latin typeface="Kievit Offc" charset="0"/>
-                <a:ea typeface="Kievit Offc" charset="0"/>
-                <a:cs typeface="Kievit Offc" charset="0"/>
-              </a:rPr>
-              <a:t> maximus, et </a:t>
-            </a:r>
-            <a:r>
-              <a:rPr lang="en-US" dirty="0" err="1">
-                <a:latin typeface="Kievit Offc" charset="0"/>
-                <a:ea typeface="Kievit Offc" charset="0"/>
-                <a:cs typeface="Kievit Offc" charset="0"/>
-              </a:rPr>
-              <a:t>ommolupta</a:t>
-            </a:r>
-            <a:r>
-              <a:rPr lang="en-US" dirty="0">
-                <a:latin typeface="Kievit Offc" charset="0"/>
-                <a:ea typeface="Kievit Offc" charset="0"/>
-                <a:cs typeface="Kievit Offc" charset="0"/>
-              </a:rPr>
-              <a:t> </a:t>
-            </a:r>
-            <a:r>
-              <a:rPr lang="en-US" dirty="0" err="1">
-                <a:latin typeface="Kievit Offc" charset="0"/>
-                <a:ea typeface="Kievit Offc" charset="0"/>
-                <a:cs typeface="Kievit Offc" charset="0"/>
-              </a:rPr>
-              <a:t>sam</a:t>
-            </a:r>
-            <a:r>
-              <a:rPr lang="en-US" dirty="0">
-                <a:latin typeface="Kievit Offc" charset="0"/>
-                <a:ea typeface="Kievit Offc" charset="0"/>
-                <a:cs typeface="Kievit Offc" charset="0"/>
-              </a:rPr>
-              <a:t> fugit </a:t>
-            </a:r>
-            <a:r>
-              <a:rPr lang="en-US" dirty="0" err="1">
-                <a:latin typeface="Kievit Offc" charset="0"/>
-                <a:ea typeface="Kievit Offc" charset="0"/>
-                <a:cs typeface="Kievit Offc" charset="0"/>
-              </a:rPr>
-              <a:t>accab</a:t>
-            </a:r>
-            <a:r>
-              <a:rPr lang="en-US" dirty="0">
-                <a:latin typeface="Kievit Offc" charset="0"/>
-                <a:ea typeface="Kievit Offc" charset="0"/>
-                <a:cs typeface="Kievit Offc" charset="0"/>
-              </a:rPr>
-              <a:t> </a:t>
-            </a:r>
-            <a:r>
-              <a:rPr lang="en-US" dirty="0" err="1">
-                <a:latin typeface="Kievit Offc" charset="0"/>
-                <a:ea typeface="Kievit Offc" charset="0"/>
-                <a:cs typeface="Kievit Offc" charset="0"/>
-              </a:rPr>
-              <a:t>inctist</a:t>
-            </a:r>
-            <a:r>
-              <a:rPr lang="en-US" dirty="0">
-                <a:latin typeface="Kievit Offc" charset="0"/>
-                <a:ea typeface="Kievit Offc" charset="0"/>
-                <a:cs typeface="Kievit Offc" charset="0"/>
-              </a:rPr>
-              <a:t>, </a:t>
-            </a:r>
-            <a:r>
-              <a:rPr lang="en-US" dirty="0" err="1">
-                <a:latin typeface="Kievit Offc" charset="0"/>
-                <a:ea typeface="Kievit Offc" charset="0"/>
-                <a:cs typeface="Kievit Offc" charset="0"/>
-              </a:rPr>
-              <a:t>santota</a:t>
-            </a:r>
-            <a:r>
-              <a:rPr lang="en-US" dirty="0">
-                <a:latin typeface="Kievit Offc" charset="0"/>
-                <a:ea typeface="Kievit Offc" charset="0"/>
-                <a:cs typeface="Kievit Offc" charset="0"/>
-              </a:rPr>
-              <a:t> </a:t>
-            </a:r>
-            <a:r>
-              <a:rPr lang="en-US" dirty="0" err="1">
-                <a:latin typeface="Kievit Offc" charset="0"/>
-                <a:ea typeface="Kievit Offc" charset="0"/>
-                <a:cs typeface="Kievit Offc" charset="0"/>
-              </a:rPr>
-              <a:t>tinctur</a:t>
-            </a:r>
-            <a:r>
-              <a:rPr lang="en-US" dirty="0">
-                <a:latin typeface="Kievit Offc" charset="0"/>
-                <a:ea typeface="Kievit Offc" charset="0"/>
-                <a:cs typeface="Kievit Offc" charset="0"/>
-              </a:rPr>
-              <a:t> </a:t>
-            </a:r>
-            <a:r>
-              <a:rPr lang="en-US" dirty="0" err="1">
-                <a:latin typeface="Kievit Offc" charset="0"/>
-                <a:ea typeface="Kievit Offc" charset="0"/>
-                <a:cs typeface="Kievit Offc" charset="0"/>
-              </a:rPr>
-              <a:t>endessitio</a:t>
-            </a:r>
-            <a:r>
-              <a:rPr lang="en-US" dirty="0">
-                <a:latin typeface="Kievit Offc" charset="0"/>
-                <a:ea typeface="Kievit Offc" charset="0"/>
-                <a:cs typeface="Kievit Offc" charset="0"/>
-              </a:rPr>
-              <a:t> </a:t>
-            </a:r>
-            <a:r>
-              <a:rPr lang="en-US" dirty="0" err="1">
-                <a:latin typeface="Kievit Offc" charset="0"/>
-                <a:ea typeface="Kievit Offc" charset="0"/>
-                <a:cs typeface="Kievit Offc" charset="0"/>
-              </a:rPr>
-              <a:t>estion</a:t>
-            </a:r>
-            <a:r>
-              <a:rPr lang="en-US" dirty="0">
-                <a:latin typeface="Kievit Offc" charset="0"/>
-                <a:ea typeface="Kievit Offc" charset="0"/>
-                <a:cs typeface="Kievit Offc" charset="0"/>
-              </a:rPr>
-              <a:t> </a:t>
-            </a:r>
-            <a:r>
-              <a:rPr lang="en-US" dirty="0" err="1">
-                <a:latin typeface="Kievit Offc" charset="0"/>
-                <a:ea typeface="Kievit Offc" charset="0"/>
-                <a:cs typeface="Kievit Offc" charset="0"/>
-              </a:rPr>
-              <a:t>perempo</a:t>
-            </a:r>
-            <a:r>
-              <a:rPr lang="en-US" dirty="0">
-                <a:latin typeface="Kievit Offc" charset="0"/>
-                <a:ea typeface="Kievit Offc" charset="0"/>
-                <a:cs typeface="Kievit Offc" charset="0"/>
-              </a:rPr>
-              <a:t> </a:t>
-            </a:r>
-            <a:r>
-              <a:rPr lang="en-US" dirty="0" err="1">
-                <a:latin typeface="Kievit Offc" charset="0"/>
-                <a:ea typeface="Kievit Offc" charset="0"/>
-                <a:cs typeface="Kievit Offc" charset="0"/>
-              </a:rPr>
-              <a:t>reptatibus</a:t>
-            </a:r>
-            <a:r>
-              <a:rPr lang="en-US" dirty="0">
-                <a:latin typeface="Kievit Offc" charset="0"/>
-                <a:ea typeface="Kievit Offc" charset="0"/>
-                <a:cs typeface="Kievit Offc" charset="0"/>
-              </a:rPr>
-              <a:t>, id </a:t>
-            </a:r>
-            <a:r>
-              <a:rPr lang="en-US" dirty="0" err="1">
-                <a:latin typeface="Kievit Offc" charset="0"/>
-                <a:ea typeface="Kievit Offc" charset="0"/>
-                <a:cs typeface="Kievit Offc" charset="0"/>
-              </a:rPr>
-              <a:t>ut</a:t>
-            </a:r>
-            <a:r>
-              <a:rPr lang="en-US" dirty="0">
-                <a:latin typeface="Kievit Offc" charset="0"/>
-                <a:ea typeface="Kievit Offc" charset="0"/>
-                <a:cs typeface="Kievit Offc" charset="0"/>
-              </a:rPr>
-              <a:t> </a:t>
-            </a:r>
-            <a:r>
-              <a:rPr lang="en-US" dirty="0" err="1">
-                <a:latin typeface="Kievit Offc" charset="0"/>
-                <a:ea typeface="Kievit Offc" charset="0"/>
-                <a:cs typeface="Kievit Offc" charset="0"/>
-              </a:rPr>
-              <a:t>vernatur</a:t>
-            </a:r>
-            <a:r>
-              <a:rPr lang="en-US" dirty="0">
-                <a:latin typeface="Kievit Offc" charset="0"/>
-                <a:ea typeface="Kievit Offc" charset="0"/>
-                <a:cs typeface="Kievit Offc" charset="0"/>
-              </a:rPr>
-              <a:t> </a:t>
-            </a:r>
-            <a:r>
-              <a:rPr lang="en-US" dirty="0" err="1">
-                <a:latin typeface="Kievit Offc" charset="0"/>
-                <a:ea typeface="Kievit Offc" charset="0"/>
-                <a:cs typeface="Kievit Offc" charset="0"/>
-              </a:rPr>
-              <a:t>sunt</a:t>
-            </a:r>
-            <a:r>
-              <a:rPr lang="en-US" dirty="0">
-                <a:latin typeface="Kievit Offc" charset="0"/>
-                <a:ea typeface="Kievit Offc" charset="0"/>
-                <a:cs typeface="Kievit Offc" charset="0"/>
-              </a:rPr>
-              <a:t> </a:t>
-            </a:r>
-            <a:r>
-              <a:rPr lang="en-US" dirty="0" err="1">
-                <a:latin typeface="Kievit Offc" charset="0"/>
-                <a:ea typeface="Kievit Offc" charset="0"/>
-                <a:cs typeface="Kievit Offc" charset="0"/>
-              </a:rPr>
-              <a:t>mos</a:t>
-            </a:r>
-            <a:r>
-              <a:rPr lang="en-US" dirty="0">
-                <a:latin typeface="Kievit Offc" charset="0"/>
-                <a:ea typeface="Kievit Offc" charset="0"/>
-                <a:cs typeface="Kievit Offc" charset="0"/>
-              </a:rPr>
-              <a:t> </a:t>
-            </a:r>
-            <a:r>
-              <a:rPr lang="en-US" dirty="0" err="1">
-                <a:latin typeface="Kievit Offc" charset="0"/>
-                <a:ea typeface="Kievit Offc" charset="0"/>
-                <a:cs typeface="Kievit Offc" charset="0"/>
-              </a:rPr>
-              <a:t>mosam</a:t>
-            </a:r>
-            <a:r>
-              <a:rPr lang="en-US" dirty="0">
-                <a:latin typeface="Kievit Offc" charset="0"/>
-                <a:ea typeface="Kievit Offc" charset="0"/>
-                <a:cs typeface="Kievit Offc" charset="0"/>
-              </a:rPr>
-              <a:t> </a:t>
-            </a:r>
-            <a:r>
-              <a:rPr lang="en-US" dirty="0" err="1">
-                <a:latin typeface="Kievit Offc" charset="0"/>
-                <a:ea typeface="Kievit Offc" charset="0"/>
-                <a:cs typeface="Kievit Offc" charset="0"/>
-              </a:rPr>
-              <a:t>inihilissit</a:t>
-            </a:r>
-            <a:r>
-              <a:rPr lang="en-US" dirty="0">
-                <a:latin typeface="Kievit Offc" charset="0"/>
-                <a:ea typeface="Kievit Offc" charset="0"/>
-                <a:cs typeface="Kievit Offc" charset="0"/>
-              </a:rPr>
-              <a:t> quo con </a:t>
-            </a:r>
-            <a:r>
-              <a:rPr lang="en-US" dirty="0" err="1">
-                <a:latin typeface="Kievit Offc" charset="0"/>
-                <a:ea typeface="Kievit Offc" charset="0"/>
-                <a:cs typeface="Kievit Offc" charset="0"/>
-              </a:rPr>
-              <a:t>nos</a:t>
-            </a:r>
-            <a:r>
-              <a:rPr lang="en-US" dirty="0">
-                <a:latin typeface="Kievit Offc" charset="0"/>
-                <a:ea typeface="Kievit Offc" charset="0"/>
-                <a:cs typeface="Kievit Offc" charset="0"/>
-              </a:rPr>
-              <a:t> </a:t>
-            </a:r>
-            <a:r>
-              <a:rPr lang="en-US" dirty="0" err="1">
-                <a:latin typeface="Kievit Offc" charset="0"/>
-                <a:ea typeface="Kievit Offc" charset="0"/>
-                <a:cs typeface="Kievit Offc" charset="0"/>
-              </a:rPr>
-              <a:t>eume</a:t>
-            </a:r>
-            <a:r>
-              <a:rPr lang="en-US" dirty="0">
-                <a:latin typeface="Kievit Offc" charset="0"/>
-                <a:ea typeface="Kievit Offc" charset="0"/>
-                <a:cs typeface="Kievit Offc" charset="0"/>
-              </a:rPr>
-              <a:t> </a:t>
-            </a:r>
-            <a:r>
-              <a:rPr lang="en-US" dirty="0" err="1">
-                <a:latin typeface="Kievit Offc" charset="0"/>
-                <a:ea typeface="Kievit Offc" charset="0"/>
-                <a:cs typeface="Kievit Offc" charset="0"/>
-              </a:rPr>
-              <a:t>dolo</a:t>
-            </a:r>
-            <a:r>
-              <a:rPr lang="en-US" dirty="0">
-                <a:latin typeface="Kievit Offc" charset="0"/>
-                <a:ea typeface="Kievit Offc" charset="0"/>
-                <a:cs typeface="Kievit Offc" charset="0"/>
-              </a:rPr>
-              <a:t> </a:t>
-            </a:r>
-            <a:r>
-              <a:rPr lang="en-US" dirty="0" err="1">
-                <a:latin typeface="Kievit Offc" charset="0"/>
-                <a:ea typeface="Kievit Offc" charset="0"/>
-                <a:cs typeface="Kievit Offc" charset="0"/>
-              </a:rPr>
-              <a:t>quist</a:t>
-            </a:r>
-            <a:r>
-              <a:rPr lang="en-US" dirty="0">
-                <a:latin typeface="Kievit Offc" charset="0"/>
-                <a:ea typeface="Kievit Offc" charset="0"/>
-                <a:cs typeface="Kievit Offc" charset="0"/>
-              </a:rPr>
-              <a:t>, et </a:t>
-            </a:r>
-            <a:r>
-              <a:rPr lang="en-US" dirty="0" err="1">
-                <a:latin typeface="Kievit Offc" charset="0"/>
-                <a:ea typeface="Kievit Offc" charset="0"/>
-                <a:cs typeface="Kievit Offc" charset="0"/>
-              </a:rPr>
-              <a:t>laboria</a:t>
-            </a:r>
-            <a:r>
-              <a:rPr lang="en-US" dirty="0">
-                <a:latin typeface="Kievit Offc" charset="0"/>
-                <a:ea typeface="Kievit Offc" charset="0"/>
-                <a:cs typeface="Kievit Offc" charset="0"/>
-              </a:rPr>
-              <a:t> </a:t>
-            </a:r>
-            <a:r>
-              <a:rPr lang="en-US" dirty="0" err="1">
-                <a:latin typeface="Kievit Offc" charset="0"/>
-                <a:ea typeface="Kievit Offc" charset="0"/>
-                <a:cs typeface="Kievit Offc" charset="0"/>
-              </a:rPr>
-              <a:t>aciam</a:t>
-            </a:r>
-            <a:r>
-              <a:rPr lang="en-US" dirty="0">
-                <a:latin typeface="Kievit Offc" charset="0"/>
-                <a:ea typeface="Kievit Offc" charset="0"/>
-                <a:cs typeface="Kievit Offc" charset="0"/>
-              </a:rPr>
-              <a:t>. Obis </a:t>
-            </a:r>
-            <a:r>
-              <a:rPr lang="en-US" dirty="0" err="1">
-                <a:latin typeface="Kievit Offc" charset="0"/>
-                <a:ea typeface="Kievit Offc" charset="0"/>
-                <a:cs typeface="Kievit Offc" charset="0"/>
-              </a:rPr>
-              <a:t>erit</a:t>
-            </a:r>
-            <a:r>
-              <a:rPr lang="en-US" dirty="0">
-                <a:latin typeface="Kievit Offc" charset="0"/>
-                <a:ea typeface="Kievit Offc" charset="0"/>
-                <a:cs typeface="Kievit Offc" charset="0"/>
-              </a:rPr>
-              <a:t> </a:t>
-            </a:r>
-            <a:r>
-              <a:rPr lang="en-US" dirty="0" err="1">
-                <a:latin typeface="Kievit Offc" charset="0"/>
-                <a:ea typeface="Kievit Offc" charset="0"/>
-                <a:cs typeface="Kievit Offc" charset="0"/>
-              </a:rPr>
-              <a:t>erianti</a:t>
-            </a:r>
-            <a:r>
-              <a:rPr lang="en-US" dirty="0">
-                <a:latin typeface="Kievit Offc" charset="0"/>
-                <a:ea typeface="Kievit Offc" charset="0"/>
-                <a:cs typeface="Kievit Offc" charset="0"/>
-              </a:rPr>
-              <a:t> debit, </a:t>
-            </a:r>
-            <a:r>
-              <a:rPr lang="en-US" dirty="0" err="1">
-                <a:latin typeface="Kievit Offc" charset="0"/>
-                <a:ea typeface="Kievit Offc" charset="0"/>
-                <a:cs typeface="Kievit Offc" charset="0"/>
-              </a:rPr>
-              <a:t>odi</a:t>
-            </a:r>
-            <a:r>
-              <a:rPr lang="en-US" dirty="0">
-                <a:latin typeface="Kievit Offc" charset="0"/>
-                <a:ea typeface="Kievit Offc" charset="0"/>
-                <a:cs typeface="Kievit Offc" charset="0"/>
-              </a:rPr>
-              <a:t> </a:t>
-            </a:r>
-            <a:r>
-              <a:rPr lang="en-US" dirty="0" err="1">
-                <a:latin typeface="Kievit Offc" charset="0"/>
-                <a:ea typeface="Kievit Offc" charset="0"/>
-                <a:cs typeface="Kievit Offc" charset="0"/>
-              </a:rPr>
-              <a:t>consequate</a:t>
-            </a:r>
-            <a:r>
-              <a:rPr lang="en-US" dirty="0">
-                <a:latin typeface="Kievit Offc" charset="0"/>
-                <a:ea typeface="Kievit Offc" charset="0"/>
-                <a:cs typeface="Kievit Offc" charset="0"/>
-              </a:rPr>
-              <a:t> </a:t>
-            </a:r>
-            <a:r>
-              <a:rPr lang="en-US" dirty="0" err="1">
-                <a:latin typeface="Kievit Offc" charset="0"/>
-                <a:ea typeface="Kievit Offc" charset="0"/>
-                <a:cs typeface="Kievit Offc" charset="0"/>
-              </a:rPr>
-              <a:t>dolupta</a:t>
-            </a:r>
-            <a:r>
-              <a:rPr lang="en-US" dirty="0">
-                <a:latin typeface="Kievit Offc" charset="0"/>
-                <a:ea typeface="Kievit Offc" charset="0"/>
-                <a:cs typeface="Kievit Offc" charset="0"/>
-              </a:rPr>
-              <a:t> </a:t>
-            </a:r>
-            <a:r>
-              <a:rPr lang="en-US" dirty="0" err="1">
-                <a:latin typeface="Kievit Offc" charset="0"/>
-                <a:ea typeface="Kievit Offc" charset="0"/>
-                <a:cs typeface="Kievit Offc" charset="0"/>
-              </a:rPr>
-              <a:t>epudit</a:t>
-            </a:r>
-            <a:r>
-              <a:rPr lang="en-US" dirty="0">
-                <a:latin typeface="Kievit Offc" charset="0"/>
-                <a:ea typeface="Kievit Offc" charset="0"/>
-                <a:cs typeface="Kievit Offc" charset="0"/>
-              </a:rPr>
-              <a:t> et </a:t>
-            </a:r>
-            <a:r>
-              <a:rPr lang="en-US" dirty="0" err="1">
-                <a:latin typeface="Kievit Offc" charset="0"/>
-                <a:ea typeface="Kievit Offc" charset="0"/>
-                <a:cs typeface="Kievit Offc" charset="0"/>
-              </a:rPr>
-              <a:t>etur</a:t>
-            </a:r>
-            <a:r>
-              <a:rPr lang="en-US" dirty="0">
-                <a:latin typeface="Kievit Offc" charset="0"/>
-                <a:ea typeface="Kievit Offc" charset="0"/>
-                <a:cs typeface="Kievit Offc" charset="0"/>
-              </a:rPr>
-              <a:t> </a:t>
-            </a:r>
-            <a:r>
-              <a:rPr lang="en-US" dirty="0" err="1">
-                <a:latin typeface="Kievit Offc" charset="0"/>
-                <a:ea typeface="Kievit Offc" charset="0"/>
-                <a:cs typeface="Kievit Offc" charset="0"/>
-              </a:rPr>
-              <a:t>rempore</a:t>
-            </a:r>
-            <a:r>
-              <a:rPr lang="en-US" dirty="0">
-                <a:latin typeface="Kievit Offc" charset="0"/>
-                <a:ea typeface="Kievit Offc" charset="0"/>
-                <a:cs typeface="Kievit Offc" charset="0"/>
-              </a:rPr>
-              <a:t>, core </a:t>
-            </a:r>
-            <a:r>
-              <a:rPr lang="en-US" dirty="0" err="1">
-                <a:latin typeface="Kievit Offc" charset="0"/>
-                <a:ea typeface="Kievit Offc" charset="0"/>
-                <a:cs typeface="Kievit Offc" charset="0"/>
-              </a:rPr>
-              <a:t>corrovit</a:t>
-            </a:r>
-            <a:r>
-              <a:rPr lang="en-US" dirty="0">
-                <a:latin typeface="Kievit Offc" charset="0"/>
-                <a:ea typeface="Kievit Offc" charset="0"/>
-                <a:cs typeface="Kievit Offc" charset="0"/>
-              </a:rPr>
-              <a:t> </a:t>
-            </a:r>
-            <a:r>
-              <a:rPr lang="en-US" dirty="0" err="1">
-                <a:latin typeface="Kievit Offc" charset="0"/>
-                <a:ea typeface="Kievit Offc" charset="0"/>
-                <a:cs typeface="Kievit Offc" charset="0"/>
-              </a:rPr>
-              <a:t>aut</a:t>
-            </a:r>
-            <a:r>
-              <a:rPr lang="en-US" dirty="0">
-                <a:latin typeface="Kievit Offc" charset="0"/>
-                <a:ea typeface="Kievit Offc" charset="0"/>
-                <a:cs typeface="Kievit Offc" charset="0"/>
-              </a:rPr>
-              <a:t> </a:t>
-            </a:r>
-            <a:r>
-              <a:rPr lang="en-US" dirty="0" err="1">
-                <a:latin typeface="Kievit Offc" charset="0"/>
-                <a:ea typeface="Kievit Offc" charset="0"/>
-                <a:cs typeface="Kievit Offc" charset="0"/>
-              </a:rPr>
-              <a:t>ipsantiunt</a:t>
-            </a:r>
-            <a:r>
-              <a:rPr lang="en-US" dirty="0">
-                <a:latin typeface="Kievit Offc" charset="0"/>
-                <a:ea typeface="Kievit Offc" charset="0"/>
-                <a:cs typeface="Kievit Offc" charset="0"/>
-              </a:rPr>
-              <a:t> </a:t>
-            </a:r>
-            <a:r>
-              <a:rPr lang="en-US" dirty="0" err="1">
-                <a:latin typeface="Kievit Offc" charset="0"/>
-                <a:ea typeface="Kievit Offc" charset="0"/>
-                <a:cs typeface="Kievit Offc" charset="0"/>
-              </a:rPr>
-              <a:t>velit</a:t>
-            </a:r>
-            <a:r>
-              <a:rPr lang="en-US" dirty="0">
-                <a:latin typeface="Kievit Offc" charset="0"/>
-                <a:ea typeface="Kievit Offc" charset="0"/>
-                <a:cs typeface="Kievit Offc" charset="0"/>
-              </a:rPr>
-              <a:t> </a:t>
-            </a:r>
-            <a:r>
-              <a:rPr lang="en-US" dirty="0" err="1">
-                <a:latin typeface="Kievit Offc" charset="0"/>
-                <a:ea typeface="Kievit Offc" charset="0"/>
-                <a:cs typeface="Kievit Offc" charset="0"/>
-              </a:rPr>
-              <a:t>quas</a:t>
-            </a:r>
-            <a:r>
-              <a:rPr lang="en-US" dirty="0">
-                <a:latin typeface="Kievit Offc" charset="0"/>
-                <a:ea typeface="Kievit Offc" charset="0"/>
-                <a:cs typeface="Kievit Offc" charset="0"/>
-              </a:rPr>
-              <a:t> </a:t>
-            </a:r>
-            <a:r>
-              <a:rPr lang="en-US" dirty="0" err="1">
-                <a:latin typeface="Kievit Offc" charset="0"/>
-                <a:ea typeface="Kievit Offc" charset="0"/>
-                <a:cs typeface="Kievit Offc" charset="0"/>
-              </a:rPr>
-              <a:t>ipsant</a:t>
-            </a:r>
-            <a:r>
-              <a:rPr lang="en-US" dirty="0">
-                <a:latin typeface="Kievit Offc" charset="0"/>
-                <a:ea typeface="Kievit Offc" charset="0"/>
-                <a:cs typeface="Kievit Offc" charset="0"/>
-              </a:rPr>
-              <a:t>, </a:t>
-            </a:r>
-            <a:r>
-              <a:rPr lang="en-US" dirty="0" err="1">
-                <a:latin typeface="Kievit Offc" charset="0"/>
-                <a:ea typeface="Kievit Offc" charset="0"/>
-                <a:cs typeface="Kievit Offc" charset="0"/>
-              </a:rPr>
-              <a:t>consenis</a:t>
-            </a:r>
-            <a:r>
-              <a:rPr lang="en-US" dirty="0">
-                <a:latin typeface="Kievit Offc" charset="0"/>
-                <a:ea typeface="Kievit Offc" charset="0"/>
-                <a:cs typeface="Kievit Offc" charset="0"/>
-              </a:rPr>
-              <a:t> </a:t>
-            </a:r>
-            <a:r>
-              <a:rPr lang="en-US" dirty="0" err="1">
-                <a:latin typeface="Kievit Offc" charset="0"/>
-                <a:ea typeface="Kievit Offc" charset="0"/>
-                <a:cs typeface="Kievit Offc" charset="0"/>
-              </a:rPr>
-              <a:t>audis</a:t>
-            </a:r>
-            <a:r>
-              <a:rPr lang="en-US" dirty="0">
-                <a:latin typeface="Kievit Offc" charset="0"/>
-                <a:ea typeface="Kievit Offc" charset="0"/>
-                <a:cs typeface="Kievit Offc" charset="0"/>
-              </a:rPr>
-              <a:t> as </a:t>
-            </a:r>
-            <a:r>
-              <a:rPr lang="en-US" dirty="0" err="1">
-                <a:latin typeface="Kievit Offc" charset="0"/>
-                <a:ea typeface="Kievit Offc" charset="0"/>
-                <a:cs typeface="Kievit Offc" charset="0"/>
-              </a:rPr>
-              <a:t>por</a:t>
-            </a:r>
-            <a:r>
-              <a:rPr lang="en-US" dirty="0">
-                <a:latin typeface="Kievit Offc" charset="0"/>
-                <a:ea typeface="Kievit Offc" charset="0"/>
-                <a:cs typeface="Kievit Offc" charset="0"/>
-              </a:rPr>
-              <a:t> sit, </a:t>
-            </a:r>
-            <a:r>
-              <a:rPr lang="en-US" dirty="0" err="1">
-                <a:latin typeface="Kievit Offc" charset="0"/>
-                <a:ea typeface="Kievit Offc" charset="0"/>
-                <a:cs typeface="Kievit Offc" charset="0"/>
-              </a:rPr>
-              <a:t>quaeped</a:t>
-            </a:r>
-            <a:r>
-              <a:rPr lang="en-US" dirty="0">
-                <a:latin typeface="Kievit Offc" charset="0"/>
-                <a:ea typeface="Kievit Offc" charset="0"/>
-                <a:cs typeface="Kievit Offc" charset="0"/>
-              </a:rPr>
-              <a:t> </a:t>
-            </a:r>
-            <a:r>
-              <a:rPr lang="en-US" dirty="0" err="1">
-                <a:latin typeface="Kievit Offc" charset="0"/>
-                <a:ea typeface="Kievit Offc" charset="0"/>
-                <a:cs typeface="Kievit Offc" charset="0"/>
-              </a:rPr>
-              <a:t>ionsequia</a:t>
-            </a:r>
-            <a:r>
-              <a:rPr lang="en-US" dirty="0">
-                <a:latin typeface="Kievit Offc" charset="0"/>
-                <a:ea typeface="Kievit Offc" charset="0"/>
-                <a:cs typeface="Kievit Offc" charset="0"/>
-              </a:rPr>
-              <a:t> </a:t>
-            </a:r>
-            <a:r>
-              <a:rPr lang="en-US" dirty="0" err="1">
-                <a:latin typeface="Kievit Offc" charset="0"/>
-                <a:ea typeface="Kievit Offc" charset="0"/>
-                <a:cs typeface="Kievit Offc" charset="0"/>
-              </a:rPr>
-              <a:t>vel</a:t>
-            </a:r>
-            <a:r>
-              <a:rPr lang="en-US" dirty="0">
-                <a:latin typeface="Kievit Offc" charset="0"/>
-                <a:ea typeface="Kievit Offc" charset="0"/>
-                <a:cs typeface="Kievit Offc" charset="0"/>
-              </a:rPr>
-              <a:t> </a:t>
-            </a:r>
-            <a:r>
-              <a:rPr lang="en-US" dirty="0" err="1">
-                <a:latin typeface="Kievit Offc" charset="0"/>
-                <a:ea typeface="Kievit Offc" charset="0"/>
-                <a:cs typeface="Kievit Offc" charset="0"/>
-              </a:rPr>
-              <a:t>estibus</a:t>
-            </a:r>
-            <a:r>
-              <a:rPr lang="en-US" dirty="0">
-                <a:latin typeface="Kievit Offc" charset="0"/>
-                <a:ea typeface="Kievit Offc" charset="0"/>
-                <a:cs typeface="Kievit Offc" charset="0"/>
-              </a:rPr>
-              <a:t> </a:t>
-            </a:r>
-            <a:r>
-              <a:rPr lang="en-US" dirty="0" err="1">
-                <a:latin typeface="Kievit Offc" charset="0"/>
-                <a:ea typeface="Kievit Offc" charset="0"/>
-                <a:cs typeface="Kievit Offc" charset="0"/>
-              </a:rPr>
-              <a:t>estiusam</a:t>
-            </a:r>
-            <a:r>
-              <a:rPr lang="en-US" dirty="0">
-                <a:latin typeface="Kievit Offc" charset="0"/>
-                <a:ea typeface="Kievit Offc" charset="0"/>
-                <a:cs typeface="Kievit Offc" charset="0"/>
-              </a:rPr>
-              <a:t> </a:t>
-            </a:r>
-            <a:r>
-              <a:rPr lang="en-US" dirty="0" err="1">
-                <a:latin typeface="Kievit Offc" charset="0"/>
-                <a:ea typeface="Kievit Offc" charset="0"/>
-                <a:cs typeface="Kievit Offc" charset="0"/>
-              </a:rPr>
-              <a:t>il</a:t>
-            </a:r>
-            <a:r>
-              <a:rPr lang="en-US" dirty="0">
-                <a:latin typeface="Kievit Offc" charset="0"/>
-                <a:ea typeface="Kievit Offc" charset="0"/>
-                <a:cs typeface="Kievit Offc" charset="0"/>
-              </a:rPr>
-              <a:t>.</a:t>
-            </a:r>
+              <a:rPr lang="en-US" dirty="0" smtClean="0">
+                <a:latin typeface="Kievit Offc" charset="0"/>
+                <a:ea typeface="Kievit Offc" charset="0"/>
+                <a:cs typeface="Kievit Offc" charset="0"/>
+              </a:rPr>
+              <a:t>Summarize the problem </a:t>
+            </a:r>
+            <a:r>
+              <a:rPr lang="en-US" smtClean="0">
+                <a:latin typeface="Kievit Offc" charset="0"/>
+                <a:ea typeface="Kievit Offc" charset="0"/>
+                <a:cs typeface="Kievit Offc" charset="0"/>
+              </a:rPr>
+              <a:t>statement here.</a:t>
+            </a:r>
+            <a:endParaRPr lang="en-US" dirty="0">
+              <a:latin typeface="Kievit Offc" charset="0"/>
+              <a:ea typeface="Kievit Offc" charset="0"/>
+              <a:cs typeface="Kievit Offc" charset="0"/>
+            </a:endParaRPr>
           </a:p>
         </p:txBody>
       </p:sp>
@@ -3711,7 +2010,7 @@
         <p:spPr>
           <a:xfrm>
             <a:off x="12092129" y="18495540"/>
-            <a:ext cx="9418320" cy="5206554"/>
+            <a:ext cx="9418320" cy="11823750"/>
           </a:xfrm>
           <a:prstGeom prst="rect">
             <a:avLst/>
@@ -3932,7 +2231,7 @@
                 <a:ea typeface="Kievit Offc" charset="0"/>
                 <a:cs typeface="Kievit Offc" charset="0"/>
               </a:rPr>
-              <a:t>They wil</a:t>
+              <a:t>They will then be redirected to the Region selection page. This page will allow users to select their location by state and county. On this page they will also select between long term and short term Scenarios</a:t>
             </a:r>
             <a:r>
               <a:rPr lang="en-US" dirty="0" smtClean="0">
@@ -3940,15 +2239,57 @@
                 <a:ea typeface="Kievit Offc" charset="0"/>
                 <a:cs typeface="Kievit Offc" charset="0"/>
               </a:rPr>
-              <a:t>l then be redirected to the Region selection page. This page will allow users to select their location by state and county. On this page they will also select between long term and short </a:t>
-            </a:r>
-            <a:r>
-              <a:rPr lang="en-US" smtClean="0">
-                <a:latin typeface="Kievit Offc" charset="0"/>
-                <a:ea typeface="Kievit Offc" charset="0"/>
-                <a:cs typeface="Kievit Offc" charset="0"/>
-              </a:rPr>
-              <a:t>term Scenarios. </a:t>
+              <a:t>.</a:t>
+            </a:r>
+          </a:p>
+          <a:p>
+            <a:r>
+              <a:rPr lang="en-US" dirty="0" smtClean="0">
+                <a:latin typeface="Kievit Offc" charset="0"/>
+                <a:ea typeface="Kievit Offc" charset="0"/>
+                <a:cs typeface="Kievit Offc" charset="0"/>
+              </a:rPr>
+              <a:t>Selecting A short term climate Scenario will redirect the user to a Chart page where 7 month temperature and precipitation forecasts will be plotted.</a:t>
+            </a:r>
+          </a:p>
+          <a:p>
+            <a:r>
+              <a:rPr lang="en-US" dirty="0" smtClean="0">
+                <a:latin typeface="Kievit Offc" charset="0"/>
+                <a:ea typeface="Kievit Offc" charset="0"/>
+                <a:cs typeface="Kievit Offc" charset="0"/>
+              </a:rPr>
+              <a:t>In A long term climate scenario the user will be redirected to the user to a page where they will select which variables they would like to analyze.</a:t>
+            </a:r>
+          </a:p>
+          <a:p>
+            <a:r>
+              <a:rPr lang="en-US" dirty="0" smtClean="0">
+                <a:latin typeface="Kievit Offc" charset="0"/>
+                <a:ea typeface="Kievit Offc" charset="0"/>
+                <a:cs typeface="Kievit Offc" charset="0"/>
+              </a:rPr>
+              <a:t>In both Scenarios the user will enter adjustments to the yield for each budget that they selected based on the climate variables they were shown.</a:t>
+            </a:r>
+          </a:p>
+          <a:p>
+            <a:r>
+              <a:rPr lang="en-US" dirty="0" smtClean="0">
+                <a:latin typeface="Kievit Offc" charset="0"/>
+                <a:ea typeface="Kievit Offc" charset="0"/>
+                <a:cs typeface="Kievit Offc" charset="0"/>
+              </a:rPr>
+              <a:t>The user will then be directed to the budget page where they can make adjustments to prices, inputs and other budget parameters.</a:t>
+            </a:r>
+          </a:p>
+          <a:p>
+            <a:r>
+              <a:rPr lang="en-US" dirty="0" smtClean="0">
+                <a:latin typeface="Kievit Offc" charset="0"/>
+                <a:ea typeface="Kievit Offc" charset="0"/>
+                <a:cs typeface="Kievit Offc" charset="0"/>
+              </a:rPr>
+              <a:t>Finally the user will be directed to a climate summary page summarizing what that scenario did to their budget.</a:t>
             </a:r>
           </a:p>
           <a:p>
@@ -4617,7 +2958,7 @@
           <p:cNvPr id="29" name="TextBox 28">
             <a:extLst>
               <a:ext uri="{FF2B5EF4-FFF2-40B4-BE49-F238E27FC236}">
-                <a16:creationId xmlns:a16="http://schemas.microsoft.com/office/drawing/2014/main" xmlns="" id="{44969D56-54B3-41D9-9F70-4D39C87666C2}"/>
+                <a16:creationId xmlns="" xmlns:a16="http://schemas.microsoft.com/office/drawing/2014/main" id="{44969D56-54B3-41D9-9F70-4D39C87666C2}"/>
               </a:ext>
             </a:extLst>
           </p:cNvPr>
@@ -4626,8 +2967,8 @@
         </p:nvSpPr>
         <p:spPr>
           <a:xfrm>
-            <a:off x="13144500" y="27736800"/>
-            <a:ext cx="18211799" cy="1209242"/>
+            <a:off x="23175310" y="27736800"/>
+            <a:ext cx="8180989" cy="3439403"/>
           </a:xfrm>
           <a:prstGeom prst="rect">
             <a:avLst/>
@@ -4661,7 +3002,7 @@
           <p:cNvPr id="30" name="TextBox 29">
             <a:extLst>
               <a:ext uri="{FF2B5EF4-FFF2-40B4-BE49-F238E27FC236}">
-                <a16:creationId xmlns:a16="http://schemas.microsoft.com/office/drawing/2014/main" xmlns="" id="{E819315B-CF28-499C-8E18-B84830CFBE69}"/>
+                <a16:creationId xmlns="" xmlns:a16="http://schemas.microsoft.com/office/drawing/2014/main" id="{E819315B-CF28-499C-8E18-B84830CFBE69}"/>
               </a:ext>
             </a:extLst>
           </p:cNvPr>
@@ -4707,7 +3048,7 @@
           <p:cNvPr id="31" name="TextBox 30">
             <a:extLst>
               <a:ext uri="{FF2B5EF4-FFF2-40B4-BE49-F238E27FC236}">
-                <a16:creationId xmlns:a16="http://schemas.microsoft.com/office/drawing/2014/main" xmlns="" id="{78EA3E9D-480C-40F5-9650-9968F91EDABB}"/>
+                <a16:creationId xmlns="" xmlns:a16="http://schemas.microsoft.com/office/drawing/2014/main" id="{78EA3E9D-480C-40F5-9650-9968F91EDABB}"/>
               </a:ext>
             </a:extLst>
           </p:cNvPr>
@@ -4976,7 +3317,7 @@
           <p:cNvPr id="35" name="TextBox 34">
             <a:extLst>
               <a:ext uri="{FF2B5EF4-FFF2-40B4-BE49-F238E27FC236}">
-                <a16:creationId xmlns:a16="http://schemas.microsoft.com/office/drawing/2014/main" xmlns="" id="{10CEF0F7-46FF-4EB8-BC73-32544C34A145}"/>
+                <a16:creationId xmlns="" xmlns:a16="http://schemas.microsoft.com/office/drawing/2014/main" id="{10CEF0F7-46FF-4EB8-BC73-32544C34A145}"/>
               </a:ext>
             </a:extLst>
           </p:cNvPr>
@@ -5026,7 +3367,7 @@
           <p:cNvPr id="36" name="Text Placeholder 16">
             <a:extLst>
               <a:ext uri="{FF2B5EF4-FFF2-40B4-BE49-F238E27FC236}">
-                <a16:creationId xmlns:a16="http://schemas.microsoft.com/office/drawing/2014/main" xmlns="" id="{605E48FC-F83C-4FAF-A5D4-A48DD6A8539A}"/>
+                <a16:creationId xmlns="" xmlns:a16="http://schemas.microsoft.com/office/drawing/2014/main" id="{605E48FC-F83C-4FAF-A5D4-A48DD6A8539A}"/>
               </a:ext>
             </a:extLst>
           </p:cNvPr>
@@ -5159,7 +3500,7 @@
           <p:cNvPr id="37" name="TextBox 36">
             <a:extLst>
               <a:ext uri="{FF2B5EF4-FFF2-40B4-BE49-F238E27FC236}">
-                <a16:creationId xmlns:a16="http://schemas.microsoft.com/office/drawing/2014/main" xmlns="" id="{CC55DDE4-E152-427A-814F-142E03E1EDE1}"/>
+                <a16:creationId xmlns="" xmlns:a16="http://schemas.microsoft.com/office/drawing/2014/main" id="{CC55DDE4-E152-427A-814F-142E03E1EDE1}"/>
               </a:ext>
             </a:extLst>
           </p:cNvPr>
@@ -5210,7 +3551,7 @@
           <p:cNvPr id="38" name="TextBox 37">
             <a:extLst>
               <a:ext uri="{FF2B5EF4-FFF2-40B4-BE49-F238E27FC236}">
-                <a16:creationId xmlns:a16="http://schemas.microsoft.com/office/drawing/2014/main" xmlns="" id="{560A78B7-C04F-49A8-A4D7-68F081E9C007}"/>
+                <a16:creationId xmlns="" xmlns:a16="http://schemas.microsoft.com/office/drawing/2014/main" id="{560A78B7-C04F-49A8-A4D7-68F081E9C007}"/>
               </a:ext>
             </a:extLst>
           </p:cNvPr>
@@ -5247,7 +3588,21 @@
                 <a:latin typeface="Arial"/>
                 <a:cs typeface="Arial"/>
               </a:rPr>
-              <a:t> Rest API </a:t>
+              <a:t> Rest </a:t>
+            </a:r>
+            <a:r>
+              <a:rPr lang="en-US" sz="5400" dirty="0" smtClean="0">
+                <a:latin typeface="Arial"/>
+                <a:cs typeface="Arial"/>
+              </a:rPr>
+              <a:t>API</a:t>
+            </a:r>
+            <a:r>
+              <a:rPr lang="en-US" sz="5400" dirty="0">
+                <a:latin typeface="Arial"/>
+                <a:cs typeface="Arial"/>
+              </a:rPr>
+              <a:t> </a:t>
             </a:r>
             <a:endParaRPr lang="en-US" sz="7250" dirty="0">
               <a:latin typeface="Arial"/>
@@ -5256,6 +3611,85 @@
           </a:p>
         </p:txBody>
       </p:sp>
+      <p:sp>
+        <p:nvSpPr>
+          <p:cNvPr id="6" name="TextBox 5"/>
+          <p:cNvSpPr txBox="1"/>
+          <p:nvPr/>
+        </p:nvSpPr>
+        <p:spPr>
+          <a:xfrm>
+            <a:off x="22136100" y="18713548"/>
+            <a:ext cx="9182100" cy="954107"/>
+          </a:xfrm>
+          <a:prstGeom prst="rect">
+            <a:avLst/>
+          </a:prstGeom>
+          <a:noFill/>
+        </p:spPr>
+        <p:txBody>
+          <a:bodyPr wrap="square" rtlCol="0">
+            <a:spAutoFit/>
+          </a:bodyPr>
+          <a:lstStyle/>
+          <a:p>
+            <a:r>
+              <a:rPr lang="en-US" sz="2800" dirty="0" smtClean="0"/>
+              <a:t>In this section we will discuss the </a:t>
+            </a:r>
+            <a:r>
+              <a:rPr lang="en-US" sz="2800" dirty="0" err="1" smtClean="0"/>
+              <a:t>AgBizClimate</a:t>
+            </a:r>
+            <a:r>
+              <a:rPr lang="en-US" sz="2800" dirty="0" smtClean="0"/>
+              <a:t> Rest API that retrieves the long term climate data.</a:t>
+            </a:r>
+            <a:endParaRPr lang="en-US" sz="2800" dirty="0"/>
+          </a:p>
+        </p:txBody>
+      </p:sp>
+      <p:pic>
+        <p:nvPicPr>
+          <p:cNvPr id="1026" name="Picture 2" descr="C:\Users\Nikita\Documents\AgBizClimate\ExpoPoster\Graphics\Work Flow Diagram.jpg"/>
+          <p:cNvPicPr>
+            <a:picLocks noChangeAspect="1" noChangeArrowheads="1"/>
+          </p:cNvPicPr>
+          <p:nvPr/>
+        </p:nvPicPr>
+        <p:blipFill>
+          <a:blip r:embed="rId3">
+            <a:extLst>
+              <a:ext uri="{28A0092B-C50C-407E-A947-70E740481C1C}">
+                <a14:useLocalDpi xmlns:a14="http://schemas.microsoft.com/office/drawing/2010/main" val="0"/>
+              </a:ext>
+            </a:extLst>
+          </a:blip>
+          <a:srcRect/>
+          <a:stretch>
+            <a:fillRect/>
+          </a:stretch>
+        </p:blipFill>
+        <p:spPr bwMode="auto">
+          <a:xfrm>
+            <a:off x="10228062" y="8676143"/>
+            <a:ext cx="11584525" cy="8304360"/>
+          </a:xfrm>
+          <a:prstGeom prst="rect">
+            <a:avLst/>
+          </a:prstGeom>
+          <a:noFill/>
+          <a:extLst>
+            <a:ext uri="{909E8E84-426E-40DD-AFC4-6F175D3DCCD1}">
+              <a14:hiddenFill xmlns:a14="http://schemas.microsoft.com/office/drawing/2010/main">
+                <a:solidFill>
+                  <a:srgbClr val="FFFFFF"/>
+                </a:solidFill>
+              </a14:hiddenFill>
+            </a:ext>
+          </a:extLst>
+        </p:spPr>
+      </p:pic>
     </p:spTree>
     <p:extLst>
       <p:ext uri="{BB962C8B-B14F-4D97-AF65-F5344CB8AC3E}">
@@ -5524,7 +3958,7 @@
   <a:extraClrSchemeLst/>
   <a:extLst>
     <a:ext uri="{05A4C25C-085E-4340-85A3-A5531E510DB2}">
-      <thm15:themeFamily xmlns:thm15="http://schemas.microsoft.com/office/thememl/2012/main" xmlns="" name="research_poster_template-48x36" id="{C27AE9B0-0AFE-4443-A222-2E6B95A0B11D}" vid="{ED621CB8-3185-A04D-80A2-FAD4A506C8E1}"/>
+      <thm15:themeFamily xmlns="" xmlns:thm15="http://schemas.microsoft.com/office/thememl/2012/main" name="research_poster_template-48x36" id="{C27AE9B0-0AFE-4443-A222-2E6B95A0B11D}" vid="{ED621CB8-3185-A04D-80A2-FAD4A506C8E1}"/>
     </a:ext>
   </a:extLst>
 </a:theme>
@@ -5785,7 +4219,7 @@
   <a:extraClrSchemeLst/>
   <a:extLst>
     <a:ext uri="{05A4C25C-085E-4340-85A3-A5531E510DB2}">
-      <thm15:themeFamily xmlns:thm15="http://schemas.microsoft.com/office/thememl/2012/main" xmlns="" name="Office Theme" id="{62F939B6-93AF-4DB8-9C6B-D6C7DFDC589F}" vid="{4A3C46E8-61CC-4603-A589-7422A47A8E4A}"/>
+      <thm15:themeFamily xmlns="" xmlns:thm15="http://schemas.microsoft.com/office/thememl/2012/main" name="Office Theme" id="{62F939B6-93AF-4DB8-9C6B-D6C7DFDC589F}" vid="{4A3C46E8-61CC-4603-A589-7422A47A8E4A}"/>
     </a:ext>
   </a:extLst>
 </a:theme>

</xml_diff>

<commit_message>
Worked on AgBiz Cimate Expo Poster Finished Rough draft
</commit_message>
<xml_diff>
--- a/ExpoPoster/Poster.pptx
+++ b/ExpoPoster/Poster.pptx
@@ -109,7 +109,7 @@
   </p:defaultTextStyle>
   <p:extLst>
     <p:ext uri="{EFAFB233-063F-42B5-8137-9DF3F51BA10A}">
-      <p15:sldGuideLst xmlns="" xmlns:p15="http://schemas.microsoft.com/office/powerpoint/2012/main">
+      <p15:sldGuideLst xmlns:p15="http://schemas.microsoft.com/office/powerpoint/2012/main" xmlns="">
         <p15:guide id="1" orient="horz" pos="10368">
           <p15:clr>
             <a:srgbClr val="A4A3A4"/>
@@ -208,7 +208,7 @@
           <a:p>
             <a:fld id="{9CF59EBC-EC05-6B4D-B166-DDFA6A1EDCB6}" type="datetimeFigureOut">
               <a:rPr lang="en-US" smtClean="0"/>
-              <a:t>2/11/2018</a:t>
+              <a:t>2/12/2018</a:t>
             </a:fld>
             <a:endParaRPr lang="en-US"/>
           </a:p>
@@ -1506,7 +1506,7 @@
           <p:cNvPr id="33" name="Picture 33" descr="A large green field&#10;&#10;Description generated with high confidence">
             <a:extLst>
               <a:ext uri="{FF2B5EF4-FFF2-40B4-BE49-F238E27FC236}">
-                <a16:creationId xmlns="" xmlns:a16="http://schemas.microsoft.com/office/drawing/2014/main" id="{7DBBADAF-CB85-4A8C-AEDD-F5A4319DFC7C}"/>
+                <a16:creationId xmlns:a16="http://schemas.microsoft.com/office/drawing/2014/main" xmlns="" id="{7DBBADAF-CB85-4A8C-AEDD-F5A4319DFC7C}"/>
               </a:ext>
             </a:extLst>
           </p:cNvPr>
@@ -1538,7 +1538,7 @@
         </p:nvSpPr>
         <p:spPr>
           <a:xfrm>
-            <a:off x="1920240" y="18495540"/>
+            <a:off x="1920240" y="24974445"/>
             <a:ext cx="9418320" cy="4796185"/>
           </a:xfrm>
           <a:prstGeom prst="rect">
@@ -1795,8 +1795,8 @@
         </p:nvSpPr>
         <p:spPr>
           <a:xfrm>
-            <a:off x="1920240" y="24028385"/>
-            <a:ext cx="9418320" cy="436017"/>
+            <a:off x="1989202" y="18495540"/>
+            <a:ext cx="9418320" cy="5334794"/>
           </a:xfrm>
           <a:prstGeom prst="rect">
             <a:avLst/>
@@ -1976,20 +1976,51 @@
           </a:lstStyle>
           <a:p>
             <a:r>
+              <a:rPr lang="en-US" dirty="0">
+                <a:latin typeface="Kievit Offc" charset="0"/>
+                <a:ea typeface="Kievit Offc" charset="0"/>
+                <a:cs typeface="Kievit Offc" charset="0"/>
+              </a:rPr>
+              <a:t> </a:t>
+            </a:r>
+            <a:r>
               <a:rPr lang="en-US" dirty="0" smtClean="0">
                 <a:latin typeface="Kievit Offc" charset="0"/>
                 <a:ea typeface="Kievit Offc" charset="0"/>
                 <a:cs typeface="Kievit Offc" charset="0"/>
               </a:rPr>
-              <a:t>Summarize the problem </a:t>
-            </a:r>
-            <a:r>
-              <a:rPr lang="en-US" smtClean="0">
+              <a:t>    Climate change is a huge problem facing many farmers and ranchers. As the climate changes farmers will need to adapt and modify what they grow and how they grow it. To solve this problem will require intelligent data driven solutions.</a:t>
+            </a:r>
+            <a:endParaRPr lang="en-US" dirty="0" smtClean="0">
+              <a:latin typeface="Kievit Offc" charset="0"/>
+              <a:ea typeface="Kievit Offc" charset="0"/>
+              <a:cs typeface="Kievit Offc" charset="0"/>
+            </a:endParaRPr>
+          </a:p>
+          <a:p>
+            <a:r>
+              <a:rPr lang="en-US" dirty="0">
                 <a:latin typeface="Kievit Offc" charset="0"/>
                 <a:ea typeface="Kievit Offc" charset="0"/>
                 <a:cs typeface="Kievit Offc" charset="0"/>
               </a:rPr>
-              <a:t>statement here.</a:t>
+              <a:t>  </a:t>
+            </a:r>
+            <a:r>
+              <a:rPr lang="en-US" dirty="0" smtClean="0">
+                <a:latin typeface="Kievit Offc" charset="0"/>
+                <a:ea typeface="Kievit Offc" charset="0"/>
+                <a:cs typeface="Kievit Offc" charset="0"/>
+              </a:rPr>
+              <a:t>   </a:t>
+            </a:r>
+            <a:r>
+              <a:rPr lang="en-US" dirty="0" smtClean="0">
+                <a:latin typeface="Kievit Offc" charset="0"/>
+                <a:ea typeface="Kievit Offc" charset="0"/>
+                <a:cs typeface="Kievit Offc" charset="0"/>
+              </a:rPr>
+              <a:t>This project seeks to arm farmers and rancher with a suit of climate tools to help mitigate the effects of climate change. Currently there is already a long term climate tool that helps make longer term predictions. The focus of this project is providing seasonal guidance to farmers and ranches ultimately helping farmers to be more efficient and more profitable.</a:t>
             </a:r>
             <a:endParaRPr lang="en-US" dirty="0">
               <a:latin typeface="Kievit Offc" charset="0"/>
@@ -2231,15 +2262,7 @@
                 <a:ea typeface="Kievit Offc" charset="0"/>
                 <a:cs typeface="Kievit Offc" charset="0"/>
               </a:rPr>
-              <a:t>They will then be redirected to the Region selection page. This page will allow users to select their location by state and county. On this page they will also select between long term and short term Scenarios</a:t>
-            </a:r>
-            <a:r>
-              <a:rPr lang="en-US" dirty="0" smtClean="0">
-                <a:latin typeface="Kievit Offc" charset="0"/>
-                <a:ea typeface="Kievit Offc" charset="0"/>
-                <a:cs typeface="Kievit Offc" charset="0"/>
-              </a:rPr>
-              <a:t>.</a:t>
+              <a:t>They will then be redirected to the Region selection page. This page will allow users to select their location by state and county. On this page they will also select between long term and short term Scenarios.</a:t>
             </a:r>
           </a:p>
           <a:p>
@@ -2514,8 +2537,8 @@
         </p:nvSpPr>
         <p:spPr>
           <a:xfrm>
-            <a:off x="23716034" y="15410369"/>
-            <a:ext cx="7013232" cy="1000274"/>
+            <a:off x="23759188" y="11994761"/>
+            <a:ext cx="7013232" cy="1667123"/>
           </a:xfrm>
           <a:prstGeom prst="rect">
             <a:avLst/>
@@ -2703,253 +2726,88 @@
               </a:spcAft>
             </a:pPr>
             <a:r>
-              <a:rPr lang="en-US" sz="2000" dirty="0">
+              <a:rPr lang="en-US" sz="2000" dirty="0" smtClean="0">
                 <a:latin typeface="Kievit Offc" charset="0"/>
                 <a:ea typeface="Kievit Offc" charset="0"/>
                 <a:cs typeface="Kievit Offc" charset="0"/>
               </a:rPr>
-              <a:t>Caption: </a:t>
-            </a:r>
-            <a:r>
-              <a:rPr lang="en-US" sz="2000" dirty="0" err="1">
+              <a:t>On the right is a use case diagram for the </a:t>
+            </a:r>
+            <a:r>
+              <a:rPr lang="en-US" sz="2000" dirty="0" err="1" smtClean="0">
                 <a:latin typeface="Kievit Offc" charset="0"/>
                 <a:ea typeface="Kievit Offc" charset="0"/>
                 <a:cs typeface="Kievit Offc" charset="0"/>
               </a:rPr>
-              <a:t>Dissintemquas</a:t>
-            </a:r>
-            <a:r>
-              <a:rPr lang="en-US" sz="2000" dirty="0">
+              <a:t>AgBizClimate</a:t>
+            </a:r>
+            <a:r>
+              <a:rPr lang="en-US" sz="2000" dirty="0" smtClean="0">
                 <a:latin typeface="Kievit Offc" charset="0"/>
                 <a:ea typeface="Kievit Offc" charset="0"/>
                 <a:cs typeface="Kievit Offc" charset="0"/>
               </a:rPr>
-              <a:t> </a:t>
-            </a:r>
-            <a:r>
-              <a:rPr lang="en-US" sz="2000" dirty="0" err="1">
+              <a:t> tool. </a:t>
+            </a:r>
+            <a:endParaRPr lang="en-US" sz="2000" dirty="0">
+              <a:latin typeface="Kievit Offc" charset="0"/>
+              <a:ea typeface="Kievit Offc" charset="0"/>
+              <a:cs typeface="Kievit Offc" charset="0"/>
+            </a:endParaRPr>
+          </a:p>
+          <a:p>
+            <a:pPr>
+              <a:lnSpc>
+                <a:spcPts val="2600"/>
+              </a:lnSpc>
+              <a:spcAft>
+                <a:spcPts val="0"/>
+              </a:spcAft>
+            </a:pPr>
+            <a:r>
+              <a:rPr lang="en-US" sz="2000" dirty="0" smtClean="0">
                 <a:latin typeface="Kievit Offc" charset="0"/>
                 <a:ea typeface="Kievit Offc" charset="0"/>
                 <a:cs typeface="Kievit Offc" charset="0"/>
               </a:rPr>
-              <a:t>dolorem</a:t>
-            </a:r>
-            <a:r>
-              <a:rPr lang="en-US" sz="2000" dirty="0">
+              <a:t>   On the left Is a screen shot of one of the charts used in the </a:t>
+            </a:r>
+            <a:r>
+              <a:rPr lang="en-US" sz="2000" dirty="0" err="1" smtClean="0">
                 <a:latin typeface="Kievit Offc" charset="0"/>
                 <a:ea typeface="Kievit Offc" charset="0"/>
                 <a:cs typeface="Kievit Offc" charset="0"/>
               </a:rPr>
-              <a:t> </a:t>
-            </a:r>
-            <a:r>
-              <a:rPr lang="en-US" sz="2000" dirty="0" err="1">
+              <a:t>AgBizClimate</a:t>
+            </a:r>
+            <a:r>
+              <a:rPr lang="en-US" sz="2000" dirty="0" smtClean="0">
                 <a:latin typeface="Kievit Offc" charset="0"/>
                 <a:ea typeface="Kievit Offc" charset="0"/>
                 <a:cs typeface="Kievit Offc" charset="0"/>
               </a:rPr>
-              <a:t>poriaessime</a:t>
-            </a:r>
-            <a:r>
-              <a:rPr lang="en-US" sz="2000" dirty="0">
-                <a:latin typeface="Kievit Offc" charset="0"/>
-                <a:ea typeface="Kievit Offc" charset="0"/>
-                <a:cs typeface="Kievit Offc" charset="0"/>
-              </a:rPr>
-              <a:t> </a:t>
-            </a:r>
-            <a:r>
-              <a:rPr lang="en-US" sz="2000" dirty="0" err="1">
-                <a:latin typeface="Kievit Offc" charset="0"/>
-                <a:ea typeface="Kievit Offc" charset="0"/>
-                <a:cs typeface="Kievit Offc" charset="0"/>
-              </a:rPr>
-              <a:t>voluptati</a:t>
-            </a:r>
-            <a:r>
-              <a:rPr lang="en-US" sz="2000" dirty="0">
-                <a:latin typeface="Kievit Offc" charset="0"/>
-                <a:ea typeface="Kievit Offc" charset="0"/>
-                <a:cs typeface="Kievit Offc" charset="0"/>
-              </a:rPr>
-              <a:t> </a:t>
-            </a:r>
-            <a:r>
-              <a:rPr lang="en-US" sz="2000" dirty="0" err="1">
-                <a:latin typeface="Kievit Offc" charset="0"/>
-                <a:ea typeface="Kievit Offc" charset="0"/>
-                <a:cs typeface="Kievit Offc" charset="0"/>
-              </a:rPr>
-              <a:t>nam</a:t>
-            </a:r>
-            <a:r>
-              <a:rPr lang="en-US" sz="2000" dirty="0">
-                <a:latin typeface="Kievit Offc" charset="0"/>
-                <a:ea typeface="Kievit Offc" charset="0"/>
-                <a:cs typeface="Kievit Offc" charset="0"/>
-              </a:rPr>
-              <a:t> </a:t>
-            </a:r>
-            <a:r>
-              <a:rPr lang="en-US" sz="2000" dirty="0" err="1">
-                <a:latin typeface="Kievit Offc" charset="0"/>
-                <a:ea typeface="Kievit Offc" charset="0"/>
-                <a:cs typeface="Kievit Offc" charset="0"/>
-              </a:rPr>
-              <a:t>everore</a:t>
-            </a:r>
-            <a:r>
-              <a:rPr lang="en-US" sz="2000" dirty="0">
-                <a:latin typeface="Kievit Offc" charset="0"/>
-                <a:ea typeface="Kievit Offc" charset="0"/>
-                <a:cs typeface="Kievit Offc" charset="0"/>
-              </a:rPr>
-              <a:t> </a:t>
-            </a:r>
-            <a:r>
-              <a:rPr lang="en-US" sz="2000" dirty="0" err="1">
-                <a:latin typeface="Kievit Offc" charset="0"/>
-                <a:ea typeface="Kievit Offc" charset="0"/>
-                <a:cs typeface="Kievit Offc" charset="0"/>
-              </a:rPr>
-              <a:t>nobis</a:t>
-            </a:r>
-            <a:r>
-              <a:rPr lang="en-US" sz="2000" dirty="0">
-                <a:latin typeface="Kievit Offc" charset="0"/>
-                <a:ea typeface="Kievit Offc" charset="0"/>
-                <a:cs typeface="Kievit Offc" charset="0"/>
-              </a:rPr>
-              <a:t> pore </a:t>
-            </a:r>
-            <a:r>
-              <a:rPr lang="en-US" sz="2000" dirty="0" err="1">
-                <a:latin typeface="Kievit Offc" charset="0"/>
-                <a:ea typeface="Kievit Offc" charset="0"/>
-                <a:cs typeface="Kievit Offc" charset="0"/>
-              </a:rPr>
-              <a:t>eliquatur</a:t>
-            </a:r>
-            <a:r>
-              <a:rPr lang="en-US" sz="2000" dirty="0">
-                <a:latin typeface="Kievit Offc" charset="0"/>
-                <a:ea typeface="Kievit Offc" charset="0"/>
-                <a:cs typeface="Kievit Offc" charset="0"/>
-              </a:rPr>
-              <a:t> re </a:t>
-            </a:r>
-            <a:r>
-              <a:rPr lang="en-US" sz="2000" dirty="0" err="1">
-                <a:latin typeface="Kievit Offc" charset="0"/>
-                <a:ea typeface="Kievit Offc" charset="0"/>
-                <a:cs typeface="Kievit Offc" charset="0"/>
-              </a:rPr>
-              <a:t>apiet</a:t>
-            </a:r>
-            <a:r>
-              <a:rPr lang="en-US" sz="2000" dirty="0">
-                <a:latin typeface="Kievit Offc" charset="0"/>
-                <a:ea typeface="Kievit Offc" charset="0"/>
-                <a:cs typeface="Kievit Offc" charset="0"/>
-              </a:rPr>
-              <a:t> </a:t>
-            </a:r>
-            <a:r>
-              <a:rPr lang="en-US" sz="2000" dirty="0" err="1">
-                <a:latin typeface="Kievit Offc" charset="0"/>
-                <a:ea typeface="Kievit Offc" charset="0"/>
-                <a:cs typeface="Kievit Offc" charset="0"/>
-              </a:rPr>
-              <a:t>persperibus</a:t>
-            </a:r>
-            <a:r>
-              <a:rPr lang="en-US" sz="2000" dirty="0">
-                <a:latin typeface="Kievit Offc" charset="0"/>
-                <a:ea typeface="Kievit Offc" charset="0"/>
-                <a:cs typeface="Kievit Offc" charset="0"/>
-              </a:rPr>
-              <a:t> de maxim </a:t>
-            </a:r>
-            <a:r>
-              <a:rPr lang="en-US" sz="2000" dirty="0" err="1">
-                <a:latin typeface="Kievit Offc" charset="0"/>
-                <a:ea typeface="Kievit Offc" charset="0"/>
-                <a:cs typeface="Kievit Offc" charset="0"/>
-              </a:rPr>
-              <a:t>dolupta</a:t>
-            </a:r>
-            <a:r>
-              <a:rPr lang="en-US" sz="2000" dirty="0">
-                <a:latin typeface="Kievit Offc" charset="0"/>
-                <a:ea typeface="Kievit Offc" charset="0"/>
-                <a:cs typeface="Kievit Offc" charset="0"/>
-              </a:rPr>
-              <a:t> que </a:t>
-            </a:r>
-            <a:r>
-              <a:rPr lang="en-US" sz="2000" dirty="0" err="1">
-                <a:latin typeface="Kievit Offc" charset="0"/>
-                <a:ea typeface="Kievit Offc" charset="0"/>
-                <a:cs typeface="Kievit Offc" charset="0"/>
-              </a:rPr>
-              <a:t>laboreh</a:t>
-            </a:r>
-            <a:r>
-              <a:rPr lang="en-US" sz="2000" dirty="0">
-                <a:latin typeface="Kievit Offc" charset="0"/>
-                <a:ea typeface="Kievit Offc" charset="0"/>
-                <a:cs typeface="Kievit Offc" charset="0"/>
-              </a:rPr>
-              <a:t> </a:t>
-            </a:r>
-            <a:r>
-              <a:rPr lang="en-US" sz="2000" dirty="0" err="1">
-                <a:latin typeface="Kievit Offc" charset="0"/>
-                <a:ea typeface="Kievit Offc" charset="0"/>
-                <a:cs typeface="Kievit Offc" charset="0"/>
-              </a:rPr>
-              <a:t>enducillest</a:t>
-            </a:r>
-            <a:r>
-              <a:rPr lang="en-US" sz="2000" dirty="0">
-                <a:latin typeface="Kievit Offc" charset="0"/>
-                <a:ea typeface="Kievit Offc" charset="0"/>
-                <a:cs typeface="Kievit Offc" charset="0"/>
-              </a:rPr>
-              <a:t> </a:t>
-            </a:r>
-            <a:r>
-              <a:rPr lang="en-US" sz="2000" dirty="0" err="1">
-                <a:latin typeface="Kievit Offc" charset="0"/>
-                <a:ea typeface="Kievit Offc" charset="0"/>
-                <a:cs typeface="Kievit Offc" charset="0"/>
-              </a:rPr>
-              <a:t>demodi</a:t>
-            </a:r>
-            <a:r>
-              <a:rPr lang="en-US" sz="2000" dirty="0">
-                <a:latin typeface="Kievit Offc" charset="0"/>
-                <a:ea typeface="Kievit Offc" charset="0"/>
-                <a:cs typeface="Kievit Offc" charset="0"/>
-              </a:rPr>
-              <a:t> </a:t>
-            </a:r>
-            <a:r>
-              <a:rPr lang="en-US" sz="2000" dirty="0" err="1">
-                <a:latin typeface="Kievit Offc" charset="0"/>
-                <a:ea typeface="Kievit Offc" charset="0"/>
-                <a:cs typeface="Kievit Offc" charset="0"/>
-              </a:rPr>
-              <a:t>vendiant</a:t>
-            </a:r>
-            <a:r>
-              <a:rPr lang="en-US" sz="2000" dirty="0">
-                <a:latin typeface="Kievit Offc" charset="0"/>
-                <a:ea typeface="Kievit Offc" charset="0"/>
-                <a:cs typeface="Kievit Offc" charset="0"/>
-              </a:rPr>
-              <a:t>.</a:t>
-            </a:r>
+              <a:t> tool to help farmers forecast how climate may effect their crops.</a:t>
+            </a:r>
+            <a:endParaRPr lang="en-US" sz="2000" dirty="0">
+              <a:latin typeface="Kievit Offc" charset="0"/>
+              <a:ea typeface="Kievit Offc" charset="0"/>
+              <a:cs typeface="Kievit Offc" charset="0"/>
+            </a:endParaRPr>
+          </a:p>
+          <a:p>
+            <a:pPr algn="r">
+              <a:lnSpc>
+                <a:spcPts val="2600"/>
+              </a:lnSpc>
+              <a:spcAft>
+                <a:spcPts val="0"/>
+              </a:spcAft>
+            </a:pPr>
+            <a:endParaRPr lang="en-US" sz="2000" dirty="0" smtClean="0">
+              <a:latin typeface="Kievit Offc" charset="0"/>
+              <a:ea typeface="Kievit Offc" charset="0"/>
+              <a:cs typeface="Kievit Offc" charset="0"/>
+            </a:endParaRPr>
           </a:p>
         </p:txBody>
       </p:sp>
@@ -2958,7 +2816,7 @@
           <p:cNvPr id="29" name="TextBox 28">
             <a:extLst>
               <a:ext uri="{FF2B5EF4-FFF2-40B4-BE49-F238E27FC236}">
-                <a16:creationId xmlns="" xmlns:a16="http://schemas.microsoft.com/office/drawing/2014/main" id="{44969D56-54B3-41D9-9F70-4D39C87666C2}"/>
+                <a16:creationId xmlns:a16="http://schemas.microsoft.com/office/drawing/2014/main" xmlns="" id="{44969D56-54B3-41D9-9F70-4D39C87666C2}"/>
               </a:ext>
             </a:extLst>
           </p:cNvPr>
@@ -3002,7 +2860,7 @@
           <p:cNvPr id="30" name="TextBox 29">
             <a:extLst>
               <a:ext uri="{FF2B5EF4-FFF2-40B4-BE49-F238E27FC236}">
-                <a16:creationId xmlns="" xmlns:a16="http://schemas.microsoft.com/office/drawing/2014/main" id="{E819315B-CF28-499C-8E18-B84830CFBE69}"/>
+                <a16:creationId xmlns:a16="http://schemas.microsoft.com/office/drawing/2014/main" xmlns="" id="{E819315B-CF28-499C-8E18-B84830CFBE69}"/>
               </a:ext>
             </a:extLst>
           </p:cNvPr>
@@ -3048,7 +2906,7 @@
           <p:cNvPr id="31" name="TextBox 30">
             <a:extLst>
               <a:ext uri="{FF2B5EF4-FFF2-40B4-BE49-F238E27FC236}">
-                <a16:creationId xmlns="" xmlns:a16="http://schemas.microsoft.com/office/drawing/2014/main" id="{78EA3E9D-480C-40F5-9650-9968F91EDABB}"/>
+                <a16:creationId xmlns:a16="http://schemas.microsoft.com/office/drawing/2014/main" xmlns="" id="{78EA3E9D-480C-40F5-9650-9968F91EDABB}"/>
               </a:ext>
             </a:extLst>
           </p:cNvPr>
@@ -3122,7 +2980,7 @@
               <a:rPr lang="en-US" sz="2800" dirty="0"/>
               <a:t> for businesses that grow, harvest, package, add value, and sell agricultural products.</a:t>
             </a:r>
-            <a:endParaRPr lang="en-US"/>
+            <a:endParaRPr lang="en-US" dirty="0"/>
           </a:p>
           <a:p>
             <a:endParaRPr lang="en-US" sz="2800" b="1" dirty="0">
@@ -3317,7 +3175,7 @@
           <p:cNvPr id="35" name="TextBox 34">
             <a:extLst>
               <a:ext uri="{FF2B5EF4-FFF2-40B4-BE49-F238E27FC236}">
-                <a16:creationId xmlns="" xmlns:a16="http://schemas.microsoft.com/office/drawing/2014/main" id="{10CEF0F7-46FF-4EB8-BC73-32544C34A145}"/>
+                <a16:creationId xmlns:a16="http://schemas.microsoft.com/office/drawing/2014/main" xmlns="" id="{10CEF0F7-46FF-4EB8-BC73-32544C34A145}"/>
               </a:ext>
             </a:extLst>
           </p:cNvPr>
@@ -3326,7 +3184,7 @@
         </p:nvSpPr>
         <p:spPr>
           <a:xfrm>
-            <a:off x="1809750" y="17478376"/>
+            <a:off x="1927860" y="23933730"/>
             <a:ext cx="9410700" cy="923330"/>
           </a:xfrm>
           <a:prstGeom prst="rect">
@@ -3367,7 +3225,7 @@
           <p:cNvPr id="36" name="Text Placeholder 16">
             <a:extLst>
               <a:ext uri="{FF2B5EF4-FFF2-40B4-BE49-F238E27FC236}">
-                <a16:creationId xmlns="" xmlns:a16="http://schemas.microsoft.com/office/drawing/2014/main" id="{605E48FC-F83C-4FAF-A5D4-A48DD6A8539A}"/>
+                <a16:creationId xmlns:a16="http://schemas.microsoft.com/office/drawing/2014/main" xmlns="" id="{605E48FC-F83C-4FAF-A5D4-A48DD6A8539A}"/>
               </a:ext>
             </a:extLst>
           </p:cNvPr>
@@ -3378,7 +3236,7 @@
         </p:nvSpPr>
         <p:spPr>
           <a:xfrm>
-            <a:off x="1809750" y="23118816"/>
+            <a:off x="2030766" y="17388146"/>
             <a:ext cx="9418320" cy="830997"/>
           </a:xfrm>
           <a:prstGeom prst="rect">
@@ -3500,7 +3358,7 @@
           <p:cNvPr id="37" name="TextBox 36">
             <a:extLst>
               <a:ext uri="{FF2B5EF4-FFF2-40B4-BE49-F238E27FC236}">
-                <a16:creationId xmlns="" xmlns:a16="http://schemas.microsoft.com/office/drawing/2014/main" id="{CC55DDE4-E152-427A-814F-142E03E1EDE1}"/>
+                <a16:creationId xmlns:a16="http://schemas.microsoft.com/office/drawing/2014/main" xmlns="" id="{CC55DDE4-E152-427A-814F-142E03E1EDE1}"/>
               </a:ext>
             </a:extLst>
           </p:cNvPr>
@@ -3551,7 +3409,7 @@
           <p:cNvPr id="38" name="TextBox 37">
             <a:extLst>
               <a:ext uri="{FF2B5EF4-FFF2-40B4-BE49-F238E27FC236}">
-                <a16:creationId xmlns="" xmlns:a16="http://schemas.microsoft.com/office/drawing/2014/main" id="{560A78B7-C04F-49A8-A4D7-68F081E9C007}"/>
+                <a16:creationId xmlns:a16="http://schemas.microsoft.com/office/drawing/2014/main" xmlns="" id="{560A78B7-C04F-49A8-A4D7-68F081E9C007}"/>
               </a:ext>
             </a:extLst>
           </p:cNvPr>
@@ -3620,7 +3478,7 @@
         <p:spPr>
           <a:xfrm>
             <a:off x="22136100" y="18713548"/>
-            <a:ext cx="9182100" cy="954107"/>
+            <a:ext cx="9182100" cy="7417415"/>
           </a:xfrm>
           <a:prstGeom prst="rect">
             <a:avLst/>
@@ -3633,17 +3491,115 @@
           </a:bodyPr>
           <a:lstStyle/>
           <a:p>
+            <a:pPr marL="457200" indent="-457200">
+              <a:buFont typeface="Arial" charset="0"/>
+              <a:buChar char="•"/>
+            </a:pPr>
             <a:r>
               <a:rPr lang="en-US" sz="2800" dirty="0" smtClean="0"/>
-              <a:t>In this section we will discuss the </a:t>
+              <a:t>REST API that provides the climate data for the short term projections.</a:t>
+            </a:r>
+          </a:p>
+          <a:p>
+            <a:pPr marL="457200" indent="-457200">
+              <a:buFont typeface="Arial" charset="0"/>
+              <a:buChar char="•"/>
+            </a:pPr>
+            <a:r>
+              <a:rPr lang="en-US" sz="2800" dirty="0" smtClean="0"/>
+              <a:t>This API Connects to a Database run by the University of Idaho .</a:t>
+            </a:r>
+          </a:p>
+          <a:p>
+            <a:pPr marL="2300630" lvl="1" indent="-457200">
+              <a:buFont typeface="Arial" charset="0"/>
+              <a:buChar char="•"/>
+            </a:pPr>
+            <a:r>
+              <a:rPr lang="en-US" sz="2800" dirty="0" smtClean="0"/>
+              <a:t>This </a:t>
             </a:r>
             <a:r>
               <a:rPr lang="en-US" sz="2800" dirty="0" err="1" smtClean="0"/>
-              <a:t>AgBizClimate</a:t>
+              <a:t>databse</a:t>
             </a:r>
             <a:r>
               <a:rPr lang="en-US" sz="2800" dirty="0" smtClean="0"/>
-              <a:t> Rest API that retrieves the long term climate data.</a:t>
+              <a:t>  uses the NOAA’s NMME data set.</a:t>
+            </a:r>
+          </a:p>
+          <a:p>
+            <a:pPr marL="2300630" lvl="1" indent="-457200">
+              <a:buFont typeface="Arial" charset="0"/>
+              <a:buChar char="•"/>
+            </a:pPr>
+            <a:r>
+              <a:rPr lang="en-US" sz="2800" dirty="0" smtClean="0"/>
+              <a:t>This dataset includes 5 different models that provide short term climate forecasts.</a:t>
+            </a:r>
+          </a:p>
+          <a:p>
+            <a:pPr marL="2300630" lvl="1" indent="-457200">
+              <a:buFont typeface="Arial" charset="0"/>
+              <a:buChar char="•"/>
+            </a:pPr>
+            <a:r>
+              <a:rPr lang="en-US" sz="2800" dirty="0" smtClean="0"/>
+              <a:t>Provides Forecasts for Temperature and Precipitation.</a:t>
+            </a:r>
+          </a:p>
+          <a:p>
+            <a:pPr marL="457200" indent="-457200">
+              <a:buFont typeface="Arial" charset="0"/>
+              <a:buChar char="•"/>
+            </a:pPr>
+            <a:r>
+              <a:rPr lang="en-US" sz="2800" dirty="0" smtClean="0"/>
+              <a:t>API connects to </a:t>
+            </a:r>
+            <a:r>
+              <a:rPr lang="en-US" sz="2800" dirty="0" err="1" smtClean="0"/>
+              <a:t>Thredds</a:t>
+            </a:r>
+            <a:r>
+              <a:rPr lang="en-US" sz="2800" dirty="0" smtClean="0"/>
+              <a:t> server using  the </a:t>
+            </a:r>
+            <a:r>
+              <a:rPr lang="en-US" sz="2800" dirty="0" err="1" smtClean="0"/>
+              <a:t>OPeNDAP</a:t>
+            </a:r>
+            <a:r>
+              <a:rPr lang="en-US" sz="2800" dirty="0" smtClean="0"/>
+              <a:t> protocol and reads NETCDF Files containing the relevant forecast data.</a:t>
+            </a:r>
+          </a:p>
+          <a:p>
+            <a:pPr marL="457200" indent="-457200">
+              <a:buFont typeface="Arial" charset="0"/>
+              <a:buChar char="•"/>
+            </a:pPr>
+            <a:r>
+              <a:rPr lang="en-US" sz="2800" dirty="0" smtClean="0"/>
+              <a:t>API Uses latitude and longitude to determine the users location. </a:t>
+            </a:r>
+          </a:p>
+          <a:p>
+            <a:pPr marL="457200" indent="-457200">
+              <a:buFont typeface="Arial" charset="0"/>
+              <a:buChar char="•"/>
+            </a:pPr>
+            <a:r>
+              <a:rPr lang="en-US" sz="2800" dirty="0" smtClean="0"/>
+              <a:t>Gets the data for the nearest location with  in a radius of 16 miles if no data is </a:t>
+            </a:r>
+            <a:r>
+              <a:rPr lang="en-US" sz="2800" dirty="0" err="1" smtClean="0"/>
+              <a:t>availible</a:t>
+            </a:r>
+            <a:r>
+              <a:rPr lang="en-US" sz="2800" dirty="0" smtClean="0"/>
+              <a:t> for a certain location.</a:t>
             </a:r>
             <a:endParaRPr lang="en-US" sz="2800" dirty="0"/>
           </a:p>
@@ -3672,8 +3628,49 @@
         </p:blipFill>
         <p:spPr bwMode="auto">
           <a:xfrm>
-            <a:off x="10228062" y="8676143"/>
+            <a:off x="11885412" y="8676143"/>
             <a:ext cx="11584525" cy="8304360"/>
+          </a:xfrm>
+          <a:prstGeom prst="rect">
+            <a:avLst/>
+          </a:prstGeom>
+          <a:noFill/>
+          <a:extLst>
+            <a:ext uri="{909E8E84-426E-40DD-AFC4-6F175D3DCCD1}">
+              <a14:hiddenFill xmlns:a14="http://schemas.microsoft.com/office/drawing/2010/main">
+                <a:solidFill>
+                  <a:srgbClr val="FFFFFF"/>
+                </a:solidFill>
+              </a14:hiddenFill>
+            </a:ext>
+          </a:extLst>
+        </p:spPr>
+      </p:pic>
+      <p:pic>
+        <p:nvPicPr>
+          <p:cNvPr id="1027" name="Picture 3" descr="C:\Users\Nikita\Documents\AgBizClimate\ExpoPoster\Graphics\Capture.JPG"/>
+          <p:cNvPicPr>
+            <a:picLocks noChangeAspect="1" noChangeArrowheads="1"/>
+          </p:cNvPicPr>
+          <p:nvPr/>
+        </p:nvPicPr>
+        <p:blipFill>
+          <a:blip r:embed="rId4">
+            <a:extLst>
+              <a:ext uri="{28A0092B-C50C-407E-A947-70E740481C1C}">
+                <a14:useLocalDpi xmlns:a14="http://schemas.microsoft.com/office/drawing/2010/main" val="0"/>
+              </a:ext>
+            </a:extLst>
+          </a:blip>
+          <a:srcRect/>
+          <a:stretch>
+            <a:fillRect/>
+          </a:stretch>
+        </p:blipFill>
+        <p:spPr bwMode="auto">
+          <a:xfrm>
+            <a:off x="2030766" y="8504692"/>
+            <a:ext cx="8594372" cy="8621257"/>
           </a:xfrm>
           <a:prstGeom prst="rect">
             <a:avLst/>
@@ -3958,7 +3955,7 @@
   <a:extraClrSchemeLst/>
   <a:extLst>
     <a:ext uri="{05A4C25C-085E-4340-85A3-A5531E510DB2}">
-      <thm15:themeFamily xmlns="" xmlns:thm15="http://schemas.microsoft.com/office/thememl/2012/main" name="research_poster_template-48x36" id="{C27AE9B0-0AFE-4443-A222-2E6B95A0B11D}" vid="{ED621CB8-3185-A04D-80A2-FAD4A506C8E1}"/>
+      <thm15:themeFamily xmlns:thm15="http://schemas.microsoft.com/office/thememl/2012/main" xmlns="" name="research_poster_template-48x36" id="{C27AE9B0-0AFE-4443-A222-2E6B95A0B11D}" vid="{ED621CB8-3185-A04D-80A2-FAD4A506C8E1}"/>
     </a:ext>
   </a:extLst>
 </a:theme>
@@ -4219,7 +4216,7 @@
   <a:extraClrSchemeLst/>
   <a:extLst>
     <a:ext uri="{05A4C25C-085E-4340-85A3-A5531E510DB2}">
-      <thm15:themeFamily xmlns="" xmlns:thm15="http://schemas.microsoft.com/office/thememl/2012/main" name="Office Theme" id="{62F939B6-93AF-4DB8-9C6B-D6C7DFDC589F}" vid="{4A3C46E8-61CC-4603-A589-7422A47A8E4A}"/>
+      <thm15:themeFamily xmlns:thm15="http://schemas.microsoft.com/office/thememl/2012/main" xmlns="" name="Office Theme" id="{62F939B6-93AF-4DB8-9C6B-D6C7DFDC589F}" vid="{4A3C46E8-61CC-4603-A589-7422A47A8E4A}"/>
     </a:ext>
   </a:extLst>
 </a:theme>

</xml_diff>